<commit_message>
Track 1 files into repository.
- modified architecture.pptx

Auto commit by GitBook Editor
</commit_message>
<xml_diff>
--- a/architecture.pptx
+++ b/architecture.pptx
@@ -6,6 +6,7 @@
   </p:sldMasterIdLst>
   <p:sldIdLst>
     <p:sldId id="256" r:id="rId2"/>
+    <p:sldId id="257" r:id="rId3"/>
   </p:sldIdLst>
   <p:sldSz cx="12192000" cy="6858000"/>
   <p:notesSz cx="6858000" cy="9144000"/>
@@ -105,10 +106,6 @@
     </a:lvl9pPr>
   </p:defaultTextStyle>
 </p:presentation>
-</file>
-
-<file path=ppt/revisionInfo.xml><?xml version="1.0" encoding="utf-8"?>
-<p1510:revInfo xmlns:a="http://schemas.openxmlformats.org/drawingml/2006/main" xmlns:r="http://schemas.openxmlformats.org/officeDocument/2006/relationships" xmlns:p1510="http://schemas.microsoft.com/office/powerpoint/2015/10/main"/>
 </file>
 
 <file path=ppt/slideLayouts/slideLayout1.xml><?xml version="1.0" encoding="utf-8"?>
@@ -3343,10 +3340,27 @@
         </p:nvSpPr>
         <p:spPr/>
         <p:txBody>
-          <a:bodyPr/>
+          <a:bodyPr>
+            <a:normAutofit fontScale="90000"/>
+          </a:bodyPr>
           <a:lstStyle/>
           <a:p>
-            <a:endParaRPr lang="ko-KR" altLang="en-US"/>
+            <a:r>
+              <a:rPr lang="en-US" altLang="ko-KR" dirty="0"/>
+              <a:t>Natural Language Processing with </a:t>
+            </a:r>
+            <a:r>
+              <a:rPr lang="en-US" altLang="ko-KR" dirty="0" err="1"/>
+              <a:t>PyTorch</a:t>
+            </a:r>
+            <a:br>
+              <a:rPr lang="en-US" altLang="ko-KR" dirty="0"/>
+            </a:br>
+            <a:r>
+              <a:rPr lang="en-US" altLang="ko-KR" dirty="0"/>
+              <a:t>Architecture</a:t>
+            </a:r>
+            <a:endParaRPr lang="ko-KR" altLang="en-US" dirty="0"/>
           </a:p>
         </p:txBody>
       </p:sp>
@@ -3371,7 +3385,11 @@
           <a:bodyPr/>
           <a:lstStyle/>
           <a:p>
-            <a:endParaRPr lang="ko-KR" altLang="en-US"/>
+            <a:r>
+              <a:rPr lang="en-US" altLang="ko-KR" dirty="0"/>
+              <a:t>Ki Hyun Kim</a:t>
+            </a:r>
+            <a:endParaRPr lang="ko-KR" altLang="en-US" dirty="0"/>
           </a:p>
         </p:txBody>
       </p:sp>
@@ -3379,6 +3397,3477 @@
     <p:extLst>
       <p:ext uri="{BB962C8B-B14F-4D97-AF65-F5344CB8AC3E}">
         <p14:creationId xmlns:p14="http://schemas.microsoft.com/office/powerpoint/2010/main" val="3313117483"/>
+      </p:ext>
+    </p:extLst>
+  </p:cSld>
+  <p:clrMapOvr>
+    <a:masterClrMapping/>
+  </p:clrMapOvr>
+</p:sld>
+</file>
+
+<file path=ppt/slides/slide2.xml><?xml version="1.0" encoding="utf-8"?>
+<p:sld xmlns:a="http://schemas.openxmlformats.org/drawingml/2006/main" xmlns:r="http://schemas.openxmlformats.org/officeDocument/2006/relationships" xmlns:p="http://schemas.openxmlformats.org/presentationml/2006/main">
+  <p:cSld>
+    <p:spTree>
+      <p:nvGrpSpPr>
+        <p:cNvPr id="1" name=""/>
+        <p:cNvGrpSpPr/>
+        <p:nvPr/>
+      </p:nvGrpSpPr>
+      <p:grpSpPr>
+        <a:xfrm>
+          <a:off x="0" y="0"/>
+          <a:ext cx="0" cy="0"/>
+          <a:chOff x="0" y="0"/>
+          <a:chExt cx="0" cy="0"/>
+        </a:xfrm>
+      </p:grpSpPr>
+      <p:sp>
+        <p:nvSpPr>
+          <p:cNvPr id="4" name="직사각형 3">
+            <a:extLst>
+              <a:ext uri="{FF2B5EF4-FFF2-40B4-BE49-F238E27FC236}">
+                <a16:creationId xmlns:a16="http://schemas.microsoft.com/office/drawing/2014/main" id="{0E06A838-FED4-4913-B61A-5FE1D6941F48}"/>
+              </a:ext>
+            </a:extLst>
+          </p:cNvPr>
+          <p:cNvSpPr/>
+          <p:nvPr/>
+        </p:nvSpPr>
+        <p:spPr>
+          <a:xfrm>
+            <a:off x="1849395" y="1931773"/>
+            <a:ext cx="1025610" cy="518984"/>
+          </a:xfrm>
+          <a:prstGeom prst="rect">
+            <a:avLst/>
+          </a:prstGeom>
+        </p:spPr>
+        <p:style>
+          <a:lnRef idx="2">
+            <a:schemeClr val="dk1"/>
+          </a:lnRef>
+          <a:fillRef idx="1">
+            <a:schemeClr val="lt1"/>
+          </a:fillRef>
+          <a:effectRef idx="0">
+            <a:schemeClr val="dk1"/>
+          </a:effectRef>
+          <a:fontRef idx="minor">
+            <a:schemeClr val="dk1"/>
+          </a:fontRef>
+        </p:style>
+        <p:txBody>
+          <a:bodyPr rtlCol="0" anchor="ctr"/>
+          <a:lstStyle/>
+          <a:p>
+            <a:pPr algn="ctr"/>
+            <a:r>
+              <a:rPr lang="en-US" altLang="ko-KR" sz="1200" dirty="0" err="1"/>
+              <a:t>softmax</a:t>
+            </a:r>
+            <a:endParaRPr lang="ko-KR" altLang="en-US" sz="1200" dirty="0"/>
+          </a:p>
+        </p:txBody>
+      </p:sp>
+      <p:sp>
+        <p:nvSpPr>
+          <p:cNvPr id="5" name="직사각형 4">
+            <a:extLst>
+              <a:ext uri="{FF2B5EF4-FFF2-40B4-BE49-F238E27FC236}">
+                <a16:creationId xmlns:a16="http://schemas.microsoft.com/office/drawing/2014/main" id="{4B17B335-4D1A-446D-9E29-B51388F1B92B}"/>
+              </a:ext>
+            </a:extLst>
+          </p:cNvPr>
+          <p:cNvSpPr/>
+          <p:nvPr/>
+        </p:nvSpPr>
+        <p:spPr>
+          <a:xfrm>
+            <a:off x="1849395" y="2833816"/>
+            <a:ext cx="1025610" cy="518984"/>
+          </a:xfrm>
+          <a:prstGeom prst="rect">
+            <a:avLst/>
+          </a:prstGeom>
+        </p:spPr>
+        <p:style>
+          <a:lnRef idx="2">
+            <a:schemeClr val="dk1"/>
+          </a:lnRef>
+          <a:fillRef idx="1">
+            <a:schemeClr val="lt1"/>
+          </a:fillRef>
+          <a:effectRef idx="0">
+            <a:schemeClr val="dk1"/>
+          </a:effectRef>
+          <a:fontRef idx="minor">
+            <a:schemeClr val="dk1"/>
+          </a:fontRef>
+        </p:style>
+        <p:txBody>
+          <a:bodyPr rtlCol="0" anchor="ctr"/>
+          <a:lstStyle/>
+          <a:p>
+            <a:pPr algn="ctr"/>
+            <a:r>
+              <a:rPr lang="en-US" altLang="ko-KR" sz="1200" dirty="0" err="1"/>
+              <a:t>rnn</a:t>
+            </a:r>
+            <a:r>
+              <a:rPr lang="en-US" altLang="ko-KR" sz="1200" dirty="0"/>
+              <a:t> cell</a:t>
+            </a:r>
+            <a:endParaRPr lang="ko-KR" altLang="en-US" sz="1200" dirty="0"/>
+          </a:p>
+        </p:txBody>
+      </p:sp>
+      <p:sp>
+        <p:nvSpPr>
+          <p:cNvPr id="6" name="직사각형 5">
+            <a:extLst>
+              <a:ext uri="{FF2B5EF4-FFF2-40B4-BE49-F238E27FC236}">
+                <a16:creationId xmlns:a16="http://schemas.microsoft.com/office/drawing/2014/main" id="{8E7904AF-3116-4A57-887D-1131464010D8}"/>
+              </a:ext>
+            </a:extLst>
+          </p:cNvPr>
+          <p:cNvSpPr/>
+          <p:nvPr/>
+        </p:nvSpPr>
+        <p:spPr>
+          <a:xfrm>
+            <a:off x="1849395" y="3735859"/>
+            <a:ext cx="1025610" cy="518984"/>
+          </a:xfrm>
+          <a:prstGeom prst="rect">
+            <a:avLst/>
+          </a:prstGeom>
+        </p:spPr>
+        <p:style>
+          <a:lnRef idx="2">
+            <a:schemeClr val="dk1"/>
+          </a:lnRef>
+          <a:fillRef idx="1">
+            <a:schemeClr val="lt1"/>
+          </a:fillRef>
+          <a:effectRef idx="0">
+            <a:schemeClr val="dk1"/>
+          </a:effectRef>
+          <a:fontRef idx="minor">
+            <a:schemeClr val="dk1"/>
+          </a:fontRef>
+        </p:style>
+        <p:txBody>
+          <a:bodyPr rtlCol="0" anchor="ctr"/>
+          <a:lstStyle/>
+          <a:p>
+            <a:pPr algn="ctr"/>
+            <a:r>
+              <a:rPr lang="en-US" altLang="ko-KR" sz="1200"/>
+              <a:t>rnn cell</a:t>
+            </a:r>
+            <a:endParaRPr lang="ko-KR" altLang="en-US" sz="1200" dirty="0"/>
+          </a:p>
+        </p:txBody>
+      </p:sp>
+      <p:sp>
+        <p:nvSpPr>
+          <p:cNvPr id="7" name="직사각형 6">
+            <a:extLst>
+              <a:ext uri="{FF2B5EF4-FFF2-40B4-BE49-F238E27FC236}">
+                <a16:creationId xmlns:a16="http://schemas.microsoft.com/office/drawing/2014/main" id="{603421FD-DC8C-4906-932D-3DF702A0C3AC}"/>
+              </a:ext>
+            </a:extLst>
+          </p:cNvPr>
+          <p:cNvSpPr/>
+          <p:nvPr/>
+        </p:nvSpPr>
+        <p:spPr>
+          <a:xfrm>
+            <a:off x="1849395" y="4637902"/>
+            <a:ext cx="1025610" cy="518984"/>
+          </a:xfrm>
+          <a:prstGeom prst="rect">
+            <a:avLst/>
+          </a:prstGeom>
+        </p:spPr>
+        <p:style>
+          <a:lnRef idx="2">
+            <a:schemeClr val="dk1"/>
+          </a:lnRef>
+          <a:fillRef idx="1">
+            <a:schemeClr val="lt1"/>
+          </a:fillRef>
+          <a:effectRef idx="0">
+            <a:schemeClr val="dk1"/>
+          </a:effectRef>
+          <a:fontRef idx="minor">
+            <a:schemeClr val="dk1"/>
+          </a:fontRef>
+        </p:style>
+        <p:txBody>
+          <a:bodyPr rtlCol="0" anchor="ctr"/>
+          <a:lstStyle/>
+          <a:p>
+            <a:pPr algn="ctr"/>
+            <a:r>
+              <a:rPr lang="en-US" altLang="ko-KR" sz="1200" dirty="0"/>
+              <a:t>embedding</a:t>
+            </a:r>
+            <a:endParaRPr lang="ko-KR" altLang="en-US" sz="1200" dirty="0"/>
+          </a:p>
+        </p:txBody>
+      </p:sp>
+      <p:cxnSp>
+        <p:nvCxnSpPr>
+          <p:cNvPr id="25" name="직선 화살표 연결선 24">
+            <a:extLst>
+              <a:ext uri="{FF2B5EF4-FFF2-40B4-BE49-F238E27FC236}">
+                <a16:creationId xmlns:a16="http://schemas.microsoft.com/office/drawing/2014/main" id="{D4B10239-C0C4-4D3D-8DBF-EB3D693F3AFF}"/>
+              </a:ext>
+            </a:extLst>
+          </p:cNvPr>
+          <p:cNvCxnSpPr>
+            <a:stCxn id="7" idx="0"/>
+            <a:endCxn id="6" idx="2"/>
+          </p:cNvCxnSpPr>
+          <p:nvPr/>
+        </p:nvCxnSpPr>
+        <p:spPr>
+          <a:xfrm flipV="1">
+            <a:off x="2362200" y="4254843"/>
+            <a:ext cx="0" cy="383059"/>
+          </a:xfrm>
+          <a:prstGeom prst="straightConnector1">
+            <a:avLst/>
+          </a:prstGeom>
+          <a:ln>
+            <a:tailEnd type="triangle"/>
+          </a:ln>
+        </p:spPr>
+        <p:style>
+          <a:lnRef idx="2">
+            <a:schemeClr val="dk1"/>
+          </a:lnRef>
+          <a:fillRef idx="1">
+            <a:schemeClr val="lt1"/>
+          </a:fillRef>
+          <a:effectRef idx="0">
+            <a:schemeClr val="dk1"/>
+          </a:effectRef>
+          <a:fontRef idx="minor">
+            <a:schemeClr val="dk1"/>
+          </a:fontRef>
+        </p:style>
+      </p:cxnSp>
+      <p:cxnSp>
+        <p:nvCxnSpPr>
+          <p:cNvPr id="26" name="직선 화살표 연결선 25">
+            <a:extLst>
+              <a:ext uri="{FF2B5EF4-FFF2-40B4-BE49-F238E27FC236}">
+                <a16:creationId xmlns:a16="http://schemas.microsoft.com/office/drawing/2014/main" id="{190F1A5A-B419-4ACA-BE07-7FF89366A406}"/>
+              </a:ext>
+            </a:extLst>
+          </p:cNvPr>
+          <p:cNvCxnSpPr>
+            <a:cxnSpLocks/>
+            <a:stCxn id="6" idx="0"/>
+            <a:endCxn id="5" idx="2"/>
+          </p:cNvCxnSpPr>
+          <p:nvPr/>
+        </p:nvCxnSpPr>
+        <p:spPr>
+          <a:xfrm flipV="1">
+            <a:off x="2362200" y="3352800"/>
+            <a:ext cx="0" cy="383059"/>
+          </a:xfrm>
+          <a:prstGeom prst="straightConnector1">
+            <a:avLst/>
+          </a:prstGeom>
+          <a:ln>
+            <a:tailEnd type="triangle"/>
+          </a:ln>
+        </p:spPr>
+        <p:style>
+          <a:lnRef idx="2">
+            <a:schemeClr val="dk1"/>
+          </a:lnRef>
+          <a:fillRef idx="1">
+            <a:schemeClr val="lt1"/>
+          </a:fillRef>
+          <a:effectRef idx="0">
+            <a:schemeClr val="dk1"/>
+          </a:effectRef>
+          <a:fontRef idx="minor">
+            <a:schemeClr val="dk1"/>
+          </a:fontRef>
+        </p:style>
+      </p:cxnSp>
+      <p:cxnSp>
+        <p:nvCxnSpPr>
+          <p:cNvPr id="29" name="직선 화살표 연결선 28">
+            <a:extLst>
+              <a:ext uri="{FF2B5EF4-FFF2-40B4-BE49-F238E27FC236}">
+                <a16:creationId xmlns:a16="http://schemas.microsoft.com/office/drawing/2014/main" id="{45347D3D-F2C9-4686-8148-99A489FCCD1A}"/>
+              </a:ext>
+            </a:extLst>
+          </p:cNvPr>
+          <p:cNvCxnSpPr>
+            <a:cxnSpLocks/>
+            <a:stCxn id="5" idx="0"/>
+            <a:endCxn id="4" idx="2"/>
+          </p:cNvCxnSpPr>
+          <p:nvPr/>
+        </p:nvCxnSpPr>
+        <p:spPr>
+          <a:xfrm flipV="1">
+            <a:off x="2362200" y="2450757"/>
+            <a:ext cx="0" cy="383059"/>
+          </a:xfrm>
+          <a:prstGeom prst="straightConnector1">
+            <a:avLst/>
+          </a:prstGeom>
+          <a:ln>
+            <a:tailEnd type="triangle"/>
+          </a:ln>
+        </p:spPr>
+        <p:style>
+          <a:lnRef idx="2">
+            <a:schemeClr val="dk1"/>
+          </a:lnRef>
+          <a:fillRef idx="1">
+            <a:schemeClr val="lt1"/>
+          </a:fillRef>
+          <a:effectRef idx="0">
+            <a:schemeClr val="dk1"/>
+          </a:effectRef>
+          <a:fontRef idx="minor">
+            <a:schemeClr val="dk1"/>
+          </a:fontRef>
+        </p:style>
+      </p:cxnSp>
+      <p:cxnSp>
+        <p:nvCxnSpPr>
+          <p:cNvPr id="32" name="직선 화살표 연결선 31">
+            <a:extLst>
+              <a:ext uri="{FF2B5EF4-FFF2-40B4-BE49-F238E27FC236}">
+                <a16:creationId xmlns:a16="http://schemas.microsoft.com/office/drawing/2014/main" id="{357B943C-D597-4C4A-9B0F-DE53BAF4DBC7}"/>
+              </a:ext>
+            </a:extLst>
+          </p:cNvPr>
+          <p:cNvCxnSpPr>
+            <a:cxnSpLocks/>
+            <a:stCxn id="35" idx="0"/>
+            <a:endCxn id="7" idx="2"/>
+          </p:cNvCxnSpPr>
+          <p:nvPr/>
+        </p:nvCxnSpPr>
+        <p:spPr>
+          <a:xfrm flipV="1">
+            <a:off x="2362200" y="5156886"/>
+            <a:ext cx="0" cy="333634"/>
+          </a:xfrm>
+          <a:prstGeom prst="straightConnector1">
+            <a:avLst/>
+          </a:prstGeom>
+          <a:ln>
+            <a:tailEnd type="triangle"/>
+          </a:ln>
+        </p:spPr>
+        <p:style>
+          <a:lnRef idx="2">
+            <a:schemeClr val="dk1"/>
+          </a:lnRef>
+          <a:fillRef idx="1">
+            <a:schemeClr val="lt1"/>
+          </a:fillRef>
+          <a:effectRef idx="0">
+            <a:schemeClr val="dk1"/>
+          </a:effectRef>
+          <a:fontRef idx="minor">
+            <a:schemeClr val="dk1"/>
+          </a:fontRef>
+        </p:style>
+      </p:cxnSp>
+      <mc:AlternateContent xmlns:mc="http://schemas.openxmlformats.org/markup-compatibility/2006">
+        <mc:Choice xmlns:a14="http://schemas.microsoft.com/office/drawing/2010/main" Requires="a14">
+          <p:sp>
+            <p:nvSpPr>
+              <p:cNvPr id="35" name="TextBox 34">
+                <a:extLst>
+                  <a:ext uri="{FF2B5EF4-FFF2-40B4-BE49-F238E27FC236}">
+                    <a16:creationId xmlns:a16="http://schemas.microsoft.com/office/drawing/2014/main" id="{E630FDCB-2C47-4F81-A03C-9CE4993D1547}"/>
+                  </a:ext>
+                </a:extLst>
+              </p:cNvPr>
+              <p:cNvSpPr txBox="1"/>
+              <p:nvPr/>
+            </p:nvSpPr>
+            <p:spPr>
+              <a:xfrm>
+                <a:off x="2114728" y="5490520"/>
+                <a:ext cx="494943" cy="369332"/>
+              </a:xfrm>
+              <a:prstGeom prst="rect">
+                <a:avLst/>
+              </a:prstGeom>
+              <a:noFill/>
+            </p:spPr>
+            <p:txBody>
+              <a:bodyPr wrap="none" rtlCol="0">
+                <a:spAutoFit/>
+              </a:bodyPr>
+              <a:lstStyle/>
+              <a:p>
+                <a14:m>
+                  <m:oMathPara xmlns:m="http://schemas.openxmlformats.org/officeDocument/2006/math">
+                    <m:oMathParaPr>
+                      <m:jc m:val="centerGroup"/>
+                    </m:oMathParaPr>
+                    <m:oMath xmlns:m="http://schemas.openxmlformats.org/officeDocument/2006/math">
+                      <m:sSub>
+                        <m:sSubPr>
+                          <m:ctrlPr>
+                            <a:rPr lang="en-US" altLang="ko-KR" i="1" smtClean="0">
+                              <a:latin typeface="Cambria Math" panose="02040503050406030204" pitchFamily="18" charset="0"/>
+                            </a:rPr>
+                          </m:ctrlPr>
+                        </m:sSubPr>
+                        <m:e>
+                          <m:r>
+                            <a:rPr lang="en-US" altLang="ko-KR" b="0" i="1" smtClean="0">
+                              <a:latin typeface="Cambria Math" panose="02040503050406030204" pitchFamily="18" charset="0"/>
+                            </a:rPr>
+                            <m:t>𝑥</m:t>
+                          </m:r>
+                        </m:e>
+                        <m:sub>
+                          <m:r>
+                            <a:rPr lang="en-US" altLang="ko-KR" b="0" i="1" smtClean="0">
+                              <a:latin typeface="Cambria Math" panose="02040503050406030204" pitchFamily="18" charset="0"/>
+                            </a:rPr>
+                            <m:t>0</m:t>
+                          </m:r>
+                        </m:sub>
+                      </m:sSub>
+                    </m:oMath>
+                  </m:oMathPara>
+                </a14:m>
+                <a:endParaRPr lang="ko-KR" altLang="en-US" dirty="0"/>
+              </a:p>
+            </p:txBody>
+          </p:sp>
+        </mc:Choice>
+        <mc:Fallback>
+          <p:sp>
+            <p:nvSpPr>
+              <p:cNvPr id="35" name="TextBox 34">
+                <a:extLst>
+                  <a:ext uri="{FF2B5EF4-FFF2-40B4-BE49-F238E27FC236}">
+                    <a16:creationId xmlns:a16="http://schemas.microsoft.com/office/drawing/2014/main" id="{E630FDCB-2C47-4F81-A03C-9CE4993D1547}"/>
+                  </a:ext>
+                </a:extLst>
+              </p:cNvPr>
+              <p:cNvSpPr txBox="1">
+                <a:spLocks noRot="1" noChangeAspect="1" noMove="1" noResize="1" noEditPoints="1" noAdjustHandles="1" noChangeArrowheads="1" noChangeShapeType="1" noTextEdit="1"/>
+              </p:cNvSpPr>
+              <p:nvPr/>
+            </p:nvSpPr>
+            <p:spPr>
+              <a:xfrm>
+                <a:off x="2114728" y="5490520"/>
+                <a:ext cx="494943" cy="369332"/>
+              </a:xfrm>
+              <a:prstGeom prst="rect">
+                <a:avLst/>
+              </a:prstGeom>
+              <a:blipFill>
+                <a:blip r:embed="rId2"/>
+                <a:stretch>
+                  <a:fillRect b="-3333"/>
+                </a:stretch>
+              </a:blipFill>
+            </p:spPr>
+            <p:txBody>
+              <a:bodyPr/>
+              <a:lstStyle/>
+              <a:p>
+                <a:r>
+                  <a:rPr lang="ko-KR" altLang="en-US">
+                    <a:noFill/>
+                  </a:rPr>
+                  <a:t> </a:t>
+                </a:r>
+              </a:p>
+            </p:txBody>
+          </p:sp>
+        </mc:Fallback>
+      </mc:AlternateContent>
+      <mc:AlternateContent xmlns:mc="http://schemas.openxmlformats.org/markup-compatibility/2006">
+        <mc:Choice xmlns:a14="http://schemas.microsoft.com/office/drawing/2010/main" Requires="a14">
+          <p:sp>
+            <p:nvSpPr>
+              <p:cNvPr id="37" name="TextBox 36">
+                <a:extLst>
+                  <a:ext uri="{FF2B5EF4-FFF2-40B4-BE49-F238E27FC236}">
+                    <a16:creationId xmlns:a16="http://schemas.microsoft.com/office/drawing/2014/main" id="{D50DEA0E-AC37-4740-9570-DABDAE8CD3A2}"/>
+                  </a:ext>
+                </a:extLst>
+              </p:cNvPr>
+              <p:cNvSpPr txBox="1"/>
+              <p:nvPr/>
+            </p:nvSpPr>
+            <p:spPr>
+              <a:xfrm>
+                <a:off x="2120050" y="1228123"/>
+                <a:ext cx="489621" cy="369332"/>
+              </a:xfrm>
+              <a:prstGeom prst="rect">
+                <a:avLst/>
+              </a:prstGeom>
+              <a:noFill/>
+            </p:spPr>
+            <p:txBody>
+              <a:bodyPr wrap="none" rtlCol="0">
+                <a:spAutoFit/>
+              </a:bodyPr>
+              <a:lstStyle/>
+              <a:p>
+                <a14:m>
+                  <m:oMathPara xmlns:m="http://schemas.openxmlformats.org/officeDocument/2006/math">
+                    <m:oMathParaPr>
+                      <m:jc m:val="centerGroup"/>
+                    </m:oMathParaPr>
+                    <m:oMath xmlns:m="http://schemas.openxmlformats.org/officeDocument/2006/math">
+                      <m:sSub>
+                        <m:sSubPr>
+                          <m:ctrlPr>
+                            <a:rPr lang="en-US" altLang="ko-KR" i="1" smtClean="0">
+                              <a:latin typeface="Cambria Math" panose="02040503050406030204" pitchFamily="18" charset="0"/>
+                            </a:rPr>
+                          </m:ctrlPr>
+                        </m:sSubPr>
+                        <m:e>
+                          <m:acc>
+                            <m:accPr>
+                              <m:chr m:val="̂"/>
+                              <m:ctrlPr>
+                                <a:rPr lang="en-US" altLang="ko-KR" i="1" smtClean="0">
+                                  <a:latin typeface="Cambria Math" panose="02040503050406030204" pitchFamily="18" charset="0"/>
+                                </a:rPr>
+                              </m:ctrlPr>
+                            </m:accPr>
+                            <m:e>
+                              <m:r>
+                                <a:rPr lang="en-US" altLang="ko-KR" b="0" i="1" smtClean="0">
+                                  <a:latin typeface="Cambria Math" panose="02040503050406030204" pitchFamily="18" charset="0"/>
+                                </a:rPr>
+                                <m:t>𝑥</m:t>
+                              </m:r>
+                            </m:e>
+                          </m:acc>
+                        </m:e>
+                        <m:sub>
+                          <m:r>
+                            <a:rPr lang="en-US" altLang="ko-KR" b="0" i="1" smtClean="0">
+                              <a:latin typeface="Cambria Math" panose="02040503050406030204" pitchFamily="18" charset="0"/>
+                            </a:rPr>
+                            <m:t>1</m:t>
+                          </m:r>
+                        </m:sub>
+                      </m:sSub>
+                    </m:oMath>
+                  </m:oMathPara>
+                </a14:m>
+                <a:endParaRPr lang="ko-KR" altLang="en-US" dirty="0"/>
+              </a:p>
+            </p:txBody>
+          </p:sp>
+        </mc:Choice>
+        <mc:Fallback>
+          <p:sp>
+            <p:nvSpPr>
+              <p:cNvPr id="37" name="TextBox 36">
+                <a:extLst>
+                  <a:ext uri="{FF2B5EF4-FFF2-40B4-BE49-F238E27FC236}">
+                    <a16:creationId xmlns:a16="http://schemas.microsoft.com/office/drawing/2014/main" id="{D50DEA0E-AC37-4740-9570-DABDAE8CD3A2}"/>
+                  </a:ext>
+                </a:extLst>
+              </p:cNvPr>
+              <p:cNvSpPr txBox="1">
+                <a:spLocks noRot="1" noChangeAspect="1" noMove="1" noResize="1" noEditPoints="1" noAdjustHandles="1" noChangeArrowheads="1" noChangeShapeType="1" noTextEdit="1"/>
+              </p:cNvSpPr>
+              <p:nvPr/>
+            </p:nvSpPr>
+            <p:spPr>
+              <a:xfrm>
+                <a:off x="2120050" y="1228123"/>
+                <a:ext cx="489621" cy="369332"/>
+              </a:xfrm>
+              <a:prstGeom prst="rect">
+                <a:avLst/>
+              </a:prstGeom>
+              <a:blipFill>
+                <a:blip r:embed="rId3"/>
+                <a:stretch>
+                  <a:fillRect t="-3279" r="-13750" b="-1639"/>
+                </a:stretch>
+              </a:blipFill>
+            </p:spPr>
+            <p:txBody>
+              <a:bodyPr/>
+              <a:lstStyle/>
+              <a:p>
+                <a:r>
+                  <a:rPr lang="ko-KR" altLang="en-US">
+                    <a:noFill/>
+                  </a:rPr>
+                  <a:t> </a:t>
+                </a:r>
+              </a:p>
+            </p:txBody>
+          </p:sp>
+        </mc:Fallback>
+      </mc:AlternateContent>
+      <p:cxnSp>
+        <p:nvCxnSpPr>
+          <p:cNvPr id="38" name="직선 화살표 연결선 37">
+            <a:extLst>
+              <a:ext uri="{FF2B5EF4-FFF2-40B4-BE49-F238E27FC236}">
+                <a16:creationId xmlns:a16="http://schemas.microsoft.com/office/drawing/2014/main" id="{D1F03281-25AB-4AF2-8FCE-57AB26AFF181}"/>
+              </a:ext>
+            </a:extLst>
+          </p:cNvPr>
+          <p:cNvCxnSpPr>
+            <a:cxnSpLocks/>
+            <a:stCxn id="4" idx="0"/>
+            <a:endCxn id="37" idx="2"/>
+          </p:cNvCxnSpPr>
+          <p:nvPr/>
+        </p:nvCxnSpPr>
+        <p:spPr>
+          <a:xfrm flipV="1">
+            <a:off x="2362200" y="1597455"/>
+            <a:ext cx="2661" cy="334318"/>
+          </a:xfrm>
+          <a:prstGeom prst="straightConnector1">
+            <a:avLst/>
+          </a:prstGeom>
+          <a:ln>
+            <a:tailEnd type="triangle"/>
+          </a:ln>
+        </p:spPr>
+        <p:style>
+          <a:lnRef idx="2">
+            <a:schemeClr val="dk1"/>
+          </a:lnRef>
+          <a:fillRef idx="1">
+            <a:schemeClr val="lt1"/>
+          </a:fillRef>
+          <a:effectRef idx="0">
+            <a:schemeClr val="dk1"/>
+          </a:effectRef>
+          <a:fontRef idx="minor">
+            <a:schemeClr val="dk1"/>
+          </a:fontRef>
+        </p:style>
+      </p:cxnSp>
+      <p:sp>
+        <p:nvSpPr>
+          <p:cNvPr id="41" name="직사각형 40">
+            <a:extLst>
+              <a:ext uri="{FF2B5EF4-FFF2-40B4-BE49-F238E27FC236}">
+                <a16:creationId xmlns:a16="http://schemas.microsoft.com/office/drawing/2014/main" id="{0BC60C19-494F-4C1C-8B37-CF15C1916AF5}"/>
+              </a:ext>
+            </a:extLst>
+          </p:cNvPr>
+          <p:cNvSpPr/>
+          <p:nvPr/>
+        </p:nvSpPr>
+        <p:spPr>
+          <a:xfrm>
+            <a:off x="3387810" y="1931773"/>
+            <a:ext cx="1025610" cy="518984"/>
+          </a:xfrm>
+          <a:prstGeom prst="rect">
+            <a:avLst/>
+          </a:prstGeom>
+        </p:spPr>
+        <p:style>
+          <a:lnRef idx="2">
+            <a:schemeClr val="dk1"/>
+          </a:lnRef>
+          <a:fillRef idx="1">
+            <a:schemeClr val="lt1"/>
+          </a:fillRef>
+          <a:effectRef idx="0">
+            <a:schemeClr val="dk1"/>
+          </a:effectRef>
+          <a:fontRef idx="minor">
+            <a:schemeClr val="dk1"/>
+          </a:fontRef>
+        </p:style>
+        <p:txBody>
+          <a:bodyPr rtlCol="0" anchor="ctr"/>
+          <a:lstStyle/>
+          <a:p>
+            <a:pPr algn="ctr"/>
+            <a:r>
+              <a:rPr lang="en-US" altLang="ko-KR" sz="1200" dirty="0" err="1"/>
+              <a:t>softmax</a:t>
+            </a:r>
+            <a:endParaRPr lang="ko-KR" altLang="en-US" sz="1200" dirty="0"/>
+          </a:p>
+        </p:txBody>
+      </p:sp>
+      <p:sp>
+        <p:nvSpPr>
+          <p:cNvPr id="42" name="직사각형 41">
+            <a:extLst>
+              <a:ext uri="{FF2B5EF4-FFF2-40B4-BE49-F238E27FC236}">
+                <a16:creationId xmlns:a16="http://schemas.microsoft.com/office/drawing/2014/main" id="{2A58C1EC-C73F-4EA4-8F9E-AB728843443D}"/>
+              </a:ext>
+            </a:extLst>
+          </p:cNvPr>
+          <p:cNvSpPr/>
+          <p:nvPr/>
+        </p:nvSpPr>
+        <p:spPr>
+          <a:xfrm>
+            <a:off x="3387810" y="2833816"/>
+            <a:ext cx="1025610" cy="518984"/>
+          </a:xfrm>
+          <a:prstGeom prst="rect">
+            <a:avLst/>
+          </a:prstGeom>
+        </p:spPr>
+        <p:style>
+          <a:lnRef idx="2">
+            <a:schemeClr val="dk1"/>
+          </a:lnRef>
+          <a:fillRef idx="1">
+            <a:schemeClr val="lt1"/>
+          </a:fillRef>
+          <a:effectRef idx="0">
+            <a:schemeClr val="dk1"/>
+          </a:effectRef>
+          <a:fontRef idx="minor">
+            <a:schemeClr val="dk1"/>
+          </a:fontRef>
+        </p:style>
+        <p:txBody>
+          <a:bodyPr rtlCol="0" anchor="ctr"/>
+          <a:lstStyle/>
+          <a:p>
+            <a:pPr algn="ctr"/>
+            <a:r>
+              <a:rPr lang="en-US" altLang="ko-KR" sz="1200" dirty="0" err="1"/>
+              <a:t>rnn</a:t>
+            </a:r>
+            <a:r>
+              <a:rPr lang="en-US" altLang="ko-KR" sz="1200" dirty="0"/>
+              <a:t> cell</a:t>
+            </a:r>
+            <a:endParaRPr lang="ko-KR" altLang="en-US" sz="1200" dirty="0"/>
+          </a:p>
+        </p:txBody>
+      </p:sp>
+      <p:sp>
+        <p:nvSpPr>
+          <p:cNvPr id="43" name="직사각형 42">
+            <a:extLst>
+              <a:ext uri="{FF2B5EF4-FFF2-40B4-BE49-F238E27FC236}">
+                <a16:creationId xmlns:a16="http://schemas.microsoft.com/office/drawing/2014/main" id="{2819E65A-4EA9-478B-96EC-06886016E82F}"/>
+              </a:ext>
+            </a:extLst>
+          </p:cNvPr>
+          <p:cNvSpPr/>
+          <p:nvPr/>
+        </p:nvSpPr>
+        <p:spPr>
+          <a:xfrm>
+            <a:off x="3387810" y="3735859"/>
+            <a:ext cx="1025610" cy="518984"/>
+          </a:xfrm>
+          <a:prstGeom prst="rect">
+            <a:avLst/>
+          </a:prstGeom>
+        </p:spPr>
+        <p:style>
+          <a:lnRef idx="2">
+            <a:schemeClr val="dk1"/>
+          </a:lnRef>
+          <a:fillRef idx="1">
+            <a:schemeClr val="lt1"/>
+          </a:fillRef>
+          <a:effectRef idx="0">
+            <a:schemeClr val="dk1"/>
+          </a:effectRef>
+          <a:fontRef idx="minor">
+            <a:schemeClr val="dk1"/>
+          </a:fontRef>
+        </p:style>
+        <p:txBody>
+          <a:bodyPr rtlCol="0" anchor="ctr"/>
+          <a:lstStyle/>
+          <a:p>
+            <a:pPr algn="ctr"/>
+            <a:r>
+              <a:rPr lang="en-US" altLang="ko-KR" sz="1200"/>
+              <a:t>rnn cell</a:t>
+            </a:r>
+            <a:endParaRPr lang="ko-KR" altLang="en-US" sz="1200" dirty="0"/>
+          </a:p>
+        </p:txBody>
+      </p:sp>
+      <p:sp>
+        <p:nvSpPr>
+          <p:cNvPr id="44" name="직사각형 43">
+            <a:extLst>
+              <a:ext uri="{FF2B5EF4-FFF2-40B4-BE49-F238E27FC236}">
+                <a16:creationId xmlns:a16="http://schemas.microsoft.com/office/drawing/2014/main" id="{55E8DD3F-6CCD-45AF-9AFE-4005CB93ACD1}"/>
+              </a:ext>
+            </a:extLst>
+          </p:cNvPr>
+          <p:cNvSpPr/>
+          <p:nvPr/>
+        </p:nvSpPr>
+        <p:spPr>
+          <a:xfrm>
+            <a:off x="3387810" y="4637902"/>
+            <a:ext cx="1025610" cy="518984"/>
+          </a:xfrm>
+          <a:prstGeom prst="rect">
+            <a:avLst/>
+          </a:prstGeom>
+        </p:spPr>
+        <p:style>
+          <a:lnRef idx="2">
+            <a:schemeClr val="dk1"/>
+          </a:lnRef>
+          <a:fillRef idx="1">
+            <a:schemeClr val="lt1"/>
+          </a:fillRef>
+          <a:effectRef idx="0">
+            <a:schemeClr val="dk1"/>
+          </a:effectRef>
+          <a:fontRef idx="minor">
+            <a:schemeClr val="dk1"/>
+          </a:fontRef>
+        </p:style>
+        <p:txBody>
+          <a:bodyPr rtlCol="0" anchor="ctr"/>
+          <a:lstStyle/>
+          <a:p>
+            <a:pPr algn="ctr"/>
+            <a:r>
+              <a:rPr lang="en-US" altLang="ko-KR" sz="1200" dirty="0"/>
+              <a:t>embedding</a:t>
+            </a:r>
+            <a:endParaRPr lang="ko-KR" altLang="en-US" sz="1200" dirty="0"/>
+          </a:p>
+        </p:txBody>
+      </p:sp>
+      <p:cxnSp>
+        <p:nvCxnSpPr>
+          <p:cNvPr id="45" name="직선 화살표 연결선 44">
+            <a:extLst>
+              <a:ext uri="{FF2B5EF4-FFF2-40B4-BE49-F238E27FC236}">
+                <a16:creationId xmlns:a16="http://schemas.microsoft.com/office/drawing/2014/main" id="{0C853062-BECE-49D2-975E-204DA9EC4CE6}"/>
+              </a:ext>
+            </a:extLst>
+          </p:cNvPr>
+          <p:cNvCxnSpPr>
+            <a:stCxn id="44" idx="0"/>
+            <a:endCxn id="43" idx="2"/>
+          </p:cNvCxnSpPr>
+          <p:nvPr/>
+        </p:nvCxnSpPr>
+        <p:spPr>
+          <a:xfrm flipV="1">
+            <a:off x="3900615" y="4254843"/>
+            <a:ext cx="0" cy="383059"/>
+          </a:xfrm>
+          <a:prstGeom prst="straightConnector1">
+            <a:avLst/>
+          </a:prstGeom>
+          <a:ln>
+            <a:tailEnd type="triangle"/>
+          </a:ln>
+        </p:spPr>
+        <p:style>
+          <a:lnRef idx="2">
+            <a:schemeClr val="dk1"/>
+          </a:lnRef>
+          <a:fillRef idx="1">
+            <a:schemeClr val="lt1"/>
+          </a:fillRef>
+          <a:effectRef idx="0">
+            <a:schemeClr val="dk1"/>
+          </a:effectRef>
+          <a:fontRef idx="minor">
+            <a:schemeClr val="dk1"/>
+          </a:fontRef>
+        </p:style>
+      </p:cxnSp>
+      <p:cxnSp>
+        <p:nvCxnSpPr>
+          <p:cNvPr id="46" name="직선 화살표 연결선 45">
+            <a:extLst>
+              <a:ext uri="{FF2B5EF4-FFF2-40B4-BE49-F238E27FC236}">
+                <a16:creationId xmlns:a16="http://schemas.microsoft.com/office/drawing/2014/main" id="{5B958F5D-DD71-4D75-A0F9-1006CFD6B533}"/>
+              </a:ext>
+            </a:extLst>
+          </p:cNvPr>
+          <p:cNvCxnSpPr>
+            <a:cxnSpLocks/>
+            <a:stCxn id="43" idx="0"/>
+            <a:endCxn id="42" idx="2"/>
+          </p:cNvCxnSpPr>
+          <p:nvPr/>
+        </p:nvCxnSpPr>
+        <p:spPr>
+          <a:xfrm flipV="1">
+            <a:off x="3900615" y="3352800"/>
+            <a:ext cx="0" cy="383059"/>
+          </a:xfrm>
+          <a:prstGeom prst="straightConnector1">
+            <a:avLst/>
+          </a:prstGeom>
+          <a:ln>
+            <a:tailEnd type="triangle"/>
+          </a:ln>
+        </p:spPr>
+        <p:style>
+          <a:lnRef idx="2">
+            <a:schemeClr val="dk1"/>
+          </a:lnRef>
+          <a:fillRef idx="1">
+            <a:schemeClr val="lt1"/>
+          </a:fillRef>
+          <a:effectRef idx="0">
+            <a:schemeClr val="dk1"/>
+          </a:effectRef>
+          <a:fontRef idx="minor">
+            <a:schemeClr val="dk1"/>
+          </a:fontRef>
+        </p:style>
+      </p:cxnSp>
+      <p:cxnSp>
+        <p:nvCxnSpPr>
+          <p:cNvPr id="47" name="직선 화살표 연결선 46">
+            <a:extLst>
+              <a:ext uri="{FF2B5EF4-FFF2-40B4-BE49-F238E27FC236}">
+                <a16:creationId xmlns:a16="http://schemas.microsoft.com/office/drawing/2014/main" id="{D1B160E3-26AA-4F15-B05C-5BE923A1BC03}"/>
+              </a:ext>
+            </a:extLst>
+          </p:cNvPr>
+          <p:cNvCxnSpPr>
+            <a:cxnSpLocks/>
+            <a:stCxn id="42" idx="0"/>
+            <a:endCxn id="41" idx="2"/>
+          </p:cNvCxnSpPr>
+          <p:nvPr/>
+        </p:nvCxnSpPr>
+        <p:spPr>
+          <a:xfrm flipV="1">
+            <a:off x="3900615" y="2450757"/>
+            <a:ext cx="0" cy="383059"/>
+          </a:xfrm>
+          <a:prstGeom prst="straightConnector1">
+            <a:avLst/>
+          </a:prstGeom>
+          <a:ln>
+            <a:tailEnd type="triangle"/>
+          </a:ln>
+        </p:spPr>
+        <p:style>
+          <a:lnRef idx="2">
+            <a:schemeClr val="dk1"/>
+          </a:lnRef>
+          <a:fillRef idx="1">
+            <a:schemeClr val="lt1"/>
+          </a:fillRef>
+          <a:effectRef idx="0">
+            <a:schemeClr val="dk1"/>
+          </a:effectRef>
+          <a:fontRef idx="minor">
+            <a:schemeClr val="dk1"/>
+          </a:fontRef>
+        </p:style>
+      </p:cxnSp>
+      <p:cxnSp>
+        <p:nvCxnSpPr>
+          <p:cNvPr id="48" name="직선 화살표 연결선 47">
+            <a:extLst>
+              <a:ext uri="{FF2B5EF4-FFF2-40B4-BE49-F238E27FC236}">
+                <a16:creationId xmlns:a16="http://schemas.microsoft.com/office/drawing/2014/main" id="{F912C9A2-1DA6-4125-8858-05EA12FB73C1}"/>
+              </a:ext>
+            </a:extLst>
+          </p:cNvPr>
+          <p:cNvCxnSpPr>
+            <a:cxnSpLocks/>
+            <a:stCxn id="49" idx="0"/>
+            <a:endCxn id="44" idx="2"/>
+          </p:cNvCxnSpPr>
+          <p:nvPr/>
+        </p:nvCxnSpPr>
+        <p:spPr>
+          <a:xfrm flipV="1">
+            <a:off x="3897954" y="5156886"/>
+            <a:ext cx="2661" cy="333634"/>
+          </a:xfrm>
+          <a:prstGeom prst="straightConnector1">
+            <a:avLst/>
+          </a:prstGeom>
+          <a:ln>
+            <a:tailEnd type="triangle"/>
+          </a:ln>
+        </p:spPr>
+        <p:style>
+          <a:lnRef idx="2">
+            <a:schemeClr val="dk1"/>
+          </a:lnRef>
+          <a:fillRef idx="1">
+            <a:schemeClr val="lt1"/>
+          </a:fillRef>
+          <a:effectRef idx="0">
+            <a:schemeClr val="dk1"/>
+          </a:effectRef>
+          <a:fontRef idx="minor">
+            <a:schemeClr val="dk1"/>
+          </a:fontRef>
+        </p:style>
+      </p:cxnSp>
+      <mc:AlternateContent xmlns:mc="http://schemas.openxmlformats.org/markup-compatibility/2006">
+        <mc:Choice xmlns:a14="http://schemas.microsoft.com/office/drawing/2010/main" Requires="a14">
+          <p:sp>
+            <p:nvSpPr>
+              <p:cNvPr id="49" name="TextBox 48">
+                <a:extLst>
+                  <a:ext uri="{FF2B5EF4-FFF2-40B4-BE49-F238E27FC236}">
+                    <a16:creationId xmlns:a16="http://schemas.microsoft.com/office/drawing/2014/main" id="{0B3C9687-0FDD-4D92-BE4F-47D281BC71F9}"/>
+                  </a:ext>
+                </a:extLst>
+              </p:cNvPr>
+              <p:cNvSpPr txBox="1"/>
+              <p:nvPr/>
+            </p:nvSpPr>
+            <p:spPr>
+              <a:xfrm>
+                <a:off x="3653143" y="5490520"/>
+                <a:ext cx="489621" cy="369332"/>
+              </a:xfrm>
+              <a:prstGeom prst="rect">
+                <a:avLst/>
+              </a:prstGeom>
+              <a:noFill/>
+            </p:spPr>
+            <p:txBody>
+              <a:bodyPr wrap="none" rtlCol="0">
+                <a:spAutoFit/>
+              </a:bodyPr>
+              <a:lstStyle/>
+              <a:p>
+                <a14:m>
+                  <m:oMathPara xmlns:m="http://schemas.openxmlformats.org/officeDocument/2006/math">
+                    <m:oMathParaPr>
+                      <m:jc m:val="centerGroup"/>
+                    </m:oMathParaPr>
+                    <m:oMath xmlns:m="http://schemas.openxmlformats.org/officeDocument/2006/math">
+                      <m:sSub>
+                        <m:sSubPr>
+                          <m:ctrlPr>
+                            <a:rPr lang="en-US" altLang="ko-KR" i="1" smtClean="0">
+                              <a:latin typeface="Cambria Math" panose="02040503050406030204" pitchFamily="18" charset="0"/>
+                            </a:rPr>
+                          </m:ctrlPr>
+                        </m:sSubPr>
+                        <m:e>
+                          <m:r>
+                            <a:rPr lang="en-US" altLang="ko-KR" b="0" i="1" smtClean="0">
+                              <a:latin typeface="Cambria Math" panose="02040503050406030204" pitchFamily="18" charset="0"/>
+                            </a:rPr>
+                            <m:t>𝑥</m:t>
+                          </m:r>
+                        </m:e>
+                        <m:sub>
+                          <m:r>
+                            <a:rPr lang="en-US" altLang="ko-KR" b="0" i="1" smtClean="0">
+                              <a:latin typeface="Cambria Math" panose="02040503050406030204" pitchFamily="18" charset="0"/>
+                            </a:rPr>
+                            <m:t>1</m:t>
+                          </m:r>
+                        </m:sub>
+                      </m:sSub>
+                    </m:oMath>
+                  </m:oMathPara>
+                </a14:m>
+                <a:endParaRPr lang="ko-KR" altLang="en-US" dirty="0"/>
+              </a:p>
+            </p:txBody>
+          </p:sp>
+        </mc:Choice>
+        <mc:Fallback>
+          <p:sp>
+            <p:nvSpPr>
+              <p:cNvPr id="49" name="TextBox 48">
+                <a:extLst>
+                  <a:ext uri="{FF2B5EF4-FFF2-40B4-BE49-F238E27FC236}">
+                    <a16:creationId xmlns:a16="http://schemas.microsoft.com/office/drawing/2014/main" id="{0B3C9687-0FDD-4D92-BE4F-47D281BC71F9}"/>
+                  </a:ext>
+                </a:extLst>
+              </p:cNvPr>
+              <p:cNvSpPr txBox="1">
+                <a:spLocks noRot="1" noChangeAspect="1" noMove="1" noResize="1" noEditPoints="1" noAdjustHandles="1" noChangeArrowheads="1" noChangeShapeType="1" noTextEdit="1"/>
+              </p:cNvSpPr>
+              <p:nvPr/>
+            </p:nvSpPr>
+            <p:spPr>
+              <a:xfrm>
+                <a:off x="3653143" y="5490520"/>
+                <a:ext cx="489621" cy="369332"/>
+              </a:xfrm>
+              <a:prstGeom prst="rect">
+                <a:avLst/>
+              </a:prstGeom>
+              <a:blipFill>
+                <a:blip r:embed="rId4"/>
+                <a:stretch>
+                  <a:fillRect b="-3333"/>
+                </a:stretch>
+              </a:blipFill>
+            </p:spPr>
+            <p:txBody>
+              <a:bodyPr/>
+              <a:lstStyle/>
+              <a:p>
+                <a:r>
+                  <a:rPr lang="ko-KR" altLang="en-US">
+                    <a:noFill/>
+                  </a:rPr>
+                  <a:t> </a:t>
+                </a:r>
+              </a:p>
+            </p:txBody>
+          </p:sp>
+        </mc:Fallback>
+      </mc:AlternateContent>
+      <mc:AlternateContent xmlns:mc="http://schemas.openxmlformats.org/markup-compatibility/2006">
+        <mc:Choice xmlns:a14="http://schemas.microsoft.com/office/drawing/2010/main" Requires="a14">
+          <p:sp>
+            <p:nvSpPr>
+              <p:cNvPr id="50" name="TextBox 49">
+                <a:extLst>
+                  <a:ext uri="{FF2B5EF4-FFF2-40B4-BE49-F238E27FC236}">
+                    <a16:creationId xmlns:a16="http://schemas.microsoft.com/office/drawing/2014/main" id="{D58B2475-B731-440C-AEBF-D6D02668C86B}"/>
+                  </a:ext>
+                </a:extLst>
+              </p:cNvPr>
+              <p:cNvSpPr txBox="1"/>
+              <p:nvPr/>
+            </p:nvSpPr>
+            <p:spPr>
+              <a:xfrm>
+                <a:off x="3658465" y="1228123"/>
+                <a:ext cx="494943" cy="369332"/>
+              </a:xfrm>
+              <a:prstGeom prst="rect">
+                <a:avLst/>
+              </a:prstGeom>
+              <a:noFill/>
+            </p:spPr>
+            <p:txBody>
+              <a:bodyPr wrap="none" rtlCol="0">
+                <a:spAutoFit/>
+              </a:bodyPr>
+              <a:lstStyle/>
+              <a:p>
+                <a14:m>
+                  <m:oMathPara xmlns:m="http://schemas.openxmlformats.org/officeDocument/2006/math">
+                    <m:oMathParaPr>
+                      <m:jc m:val="centerGroup"/>
+                    </m:oMathParaPr>
+                    <m:oMath xmlns:m="http://schemas.openxmlformats.org/officeDocument/2006/math">
+                      <m:sSub>
+                        <m:sSubPr>
+                          <m:ctrlPr>
+                            <a:rPr lang="en-US" altLang="ko-KR" i="1" smtClean="0">
+                              <a:latin typeface="Cambria Math" panose="02040503050406030204" pitchFamily="18" charset="0"/>
+                            </a:rPr>
+                          </m:ctrlPr>
+                        </m:sSubPr>
+                        <m:e>
+                          <m:acc>
+                            <m:accPr>
+                              <m:chr m:val="̂"/>
+                              <m:ctrlPr>
+                                <a:rPr lang="en-US" altLang="ko-KR" i="1" smtClean="0">
+                                  <a:latin typeface="Cambria Math" panose="02040503050406030204" pitchFamily="18" charset="0"/>
+                                </a:rPr>
+                              </m:ctrlPr>
+                            </m:accPr>
+                            <m:e>
+                              <m:r>
+                                <a:rPr lang="en-US" altLang="ko-KR" b="0" i="1" smtClean="0">
+                                  <a:latin typeface="Cambria Math" panose="02040503050406030204" pitchFamily="18" charset="0"/>
+                                </a:rPr>
+                                <m:t>𝑥</m:t>
+                              </m:r>
+                            </m:e>
+                          </m:acc>
+                        </m:e>
+                        <m:sub>
+                          <m:r>
+                            <a:rPr lang="en-US" altLang="ko-KR" b="0" i="1" smtClean="0">
+                              <a:latin typeface="Cambria Math" panose="02040503050406030204" pitchFamily="18" charset="0"/>
+                            </a:rPr>
+                            <m:t>2</m:t>
+                          </m:r>
+                        </m:sub>
+                      </m:sSub>
+                    </m:oMath>
+                  </m:oMathPara>
+                </a14:m>
+                <a:endParaRPr lang="ko-KR" altLang="en-US" dirty="0"/>
+              </a:p>
+            </p:txBody>
+          </p:sp>
+        </mc:Choice>
+        <mc:Fallback>
+          <p:sp>
+            <p:nvSpPr>
+              <p:cNvPr id="50" name="TextBox 49">
+                <a:extLst>
+                  <a:ext uri="{FF2B5EF4-FFF2-40B4-BE49-F238E27FC236}">
+                    <a16:creationId xmlns:a16="http://schemas.microsoft.com/office/drawing/2014/main" id="{D58B2475-B731-440C-AEBF-D6D02668C86B}"/>
+                  </a:ext>
+                </a:extLst>
+              </p:cNvPr>
+              <p:cNvSpPr txBox="1">
+                <a:spLocks noRot="1" noChangeAspect="1" noMove="1" noResize="1" noEditPoints="1" noAdjustHandles="1" noChangeArrowheads="1" noChangeShapeType="1" noTextEdit="1"/>
+              </p:cNvSpPr>
+              <p:nvPr/>
+            </p:nvSpPr>
+            <p:spPr>
+              <a:xfrm>
+                <a:off x="3658465" y="1228123"/>
+                <a:ext cx="494943" cy="369332"/>
+              </a:xfrm>
+              <a:prstGeom prst="rect">
+                <a:avLst/>
+              </a:prstGeom>
+              <a:blipFill>
+                <a:blip r:embed="rId5"/>
+                <a:stretch>
+                  <a:fillRect t="-3279" r="-14815" b="-1639"/>
+                </a:stretch>
+              </a:blipFill>
+            </p:spPr>
+            <p:txBody>
+              <a:bodyPr/>
+              <a:lstStyle/>
+              <a:p>
+                <a:r>
+                  <a:rPr lang="ko-KR" altLang="en-US">
+                    <a:noFill/>
+                  </a:rPr>
+                  <a:t> </a:t>
+                </a:r>
+              </a:p>
+            </p:txBody>
+          </p:sp>
+        </mc:Fallback>
+      </mc:AlternateContent>
+      <p:cxnSp>
+        <p:nvCxnSpPr>
+          <p:cNvPr id="51" name="직선 화살표 연결선 50">
+            <a:extLst>
+              <a:ext uri="{FF2B5EF4-FFF2-40B4-BE49-F238E27FC236}">
+                <a16:creationId xmlns:a16="http://schemas.microsoft.com/office/drawing/2014/main" id="{9F0FCDFB-1F78-4A73-9BA1-385BB2F3CA64}"/>
+              </a:ext>
+            </a:extLst>
+          </p:cNvPr>
+          <p:cNvCxnSpPr>
+            <a:cxnSpLocks/>
+            <a:stCxn id="41" idx="0"/>
+            <a:endCxn id="50" idx="2"/>
+          </p:cNvCxnSpPr>
+          <p:nvPr/>
+        </p:nvCxnSpPr>
+        <p:spPr>
+          <a:xfrm flipV="1">
+            <a:off x="3900615" y="1597455"/>
+            <a:ext cx="5322" cy="334318"/>
+          </a:xfrm>
+          <a:prstGeom prst="straightConnector1">
+            <a:avLst/>
+          </a:prstGeom>
+          <a:ln>
+            <a:tailEnd type="triangle"/>
+          </a:ln>
+        </p:spPr>
+        <p:style>
+          <a:lnRef idx="2">
+            <a:schemeClr val="dk1"/>
+          </a:lnRef>
+          <a:fillRef idx="1">
+            <a:schemeClr val="lt1"/>
+          </a:fillRef>
+          <a:effectRef idx="0">
+            <a:schemeClr val="dk1"/>
+          </a:effectRef>
+          <a:fontRef idx="minor">
+            <a:schemeClr val="dk1"/>
+          </a:fontRef>
+        </p:style>
+      </p:cxnSp>
+      <p:sp>
+        <p:nvSpPr>
+          <p:cNvPr id="52" name="직사각형 51">
+            <a:extLst>
+              <a:ext uri="{FF2B5EF4-FFF2-40B4-BE49-F238E27FC236}">
+                <a16:creationId xmlns:a16="http://schemas.microsoft.com/office/drawing/2014/main" id="{521345B2-00EA-4FD4-A331-8EB17A28DE0C}"/>
+              </a:ext>
+            </a:extLst>
+          </p:cNvPr>
+          <p:cNvSpPr/>
+          <p:nvPr/>
+        </p:nvSpPr>
+        <p:spPr>
+          <a:xfrm>
+            <a:off x="4923564" y="1931773"/>
+            <a:ext cx="1025610" cy="518984"/>
+          </a:xfrm>
+          <a:prstGeom prst="rect">
+            <a:avLst/>
+          </a:prstGeom>
+        </p:spPr>
+        <p:style>
+          <a:lnRef idx="2">
+            <a:schemeClr val="dk1"/>
+          </a:lnRef>
+          <a:fillRef idx="1">
+            <a:schemeClr val="lt1"/>
+          </a:fillRef>
+          <a:effectRef idx="0">
+            <a:schemeClr val="dk1"/>
+          </a:effectRef>
+          <a:fontRef idx="minor">
+            <a:schemeClr val="dk1"/>
+          </a:fontRef>
+        </p:style>
+        <p:txBody>
+          <a:bodyPr rtlCol="0" anchor="ctr"/>
+          <a:lstStyle/>
+          <a:p>
+            <a:pPr algn="ctr"/>
+            <a:r>
+              <a:rPr lang="en-US" altLang="ko-KR" sz="1200" dirty="0" err="1"/>
+              <a:t>softmax</a:t>
+            </a:r>
+            <a:endParaRPr lang="ko-KR" altLang="en-US" sz="1200" dirty="0"/>
+          </a:p>
+        </p:txBody>
+      </p:sp>
+      <p:sp>
+        <p:nvSpPr>
+          <p:cNvPr id="53" name="직사각형 52">
+            <a:extLst>
+              <a:ext uri="{FF2B5EF4-FFF2-40B4-BE49-F238E27FC236}">
+                <a16:creationId xmlns:a16="http://schemas.microsoft.com/office/drawing/2014/main" id="{93E71527-60A0-41BC-A00D-9C4D90F42BEC}"/>
+              </a:ext>
+            </a:extLst>
+          </p:cNvPr>
+          <p:cNvSpPr/>
+          <p:nvPr/>
+        </p:nvSpPr>
+        <p:spPr>
+          <a:xfrm>
+            <a:off x="4923564" y="2833816"/>
+            <a:ext cx="1025610" cy="518984"/>
+          </a:xfrm>
+          <a:prstGeom prst="rect">
+            <a:avLst/>
+          </a:prstGeom>
+        </p:spPr>
+        <p:style>
+          <a:lnRef idx="2">
+            <a:schemeClr val="dk1"/>
+          </a:lnRef>
+          <a:fillRef idx="1">
+            <a:schemeClr val="lt1"/>
+          </a:fillRef>
+          <a:effectRef idx="0">
+            <a:schemeClr val="dk1"/>
+          </a:effectRef>
+          <a:fontRef idx="minor">
+            <a:schemeClr val="dk1"/>
+          </a:fontRef>
+        </p:style>
+        <p:txBody>
+          <a:bodyPr rtlCol="0" anchor="ctr"/>
+          <a:lstStyle/>
+          <a:p>
+            <a:pPr algn="ctr"/>
+            <a:r>
+              <a:rPr lang="en-US" altLang="ko-KR" sz="1200" dirty="0" err="1"/>
+              <a:t>rnn</a:t>
+            </a:r>
+            <a:r>
+              <a:rPr lang="en-US" altLang="ko-KR" sz="1200" dirty="0"/>
+              <a:t> cell</a:t>
+            </a:r>
+            <a:endParaRPr lang="ko-KR" altLang="en-US" sz="1200" dirty="0"/>
+          </a:p>
+        </p:txBody>
+      </p:sp>
+      <p:sp>
+        <p:nvSpPr>
+          <p:cNvPr id="54" name="직사각형 53">
+            <a:extLst>
+              <a:ext uri="{FF2B5EF4-FFF2-40B4-BE49-F238E27FC236}">
+                <a16:creationId xmlns:a16="http://schemas.microsoft.com/office/drawing/2014/main" id="{9B1AE270-7D44-4AF1-8646-AA2F6F0CF3A3}"/>
+              </a:ext>
+            </a:extLst>
+          </p:cNvPr>
+          <p:cNvSpPr/>
+          <p:nvPr/>
+        </p:nvSpPr>
+        <p:spPr>
+          <a:xfrm>
+            <a:off x="4923564" y="3735859"/>
+            <a:ext cx="1025610" cy="518984"/>
+          </a:xfrm>
+          <a:prstGeom prst="rect">
+            <a:avLst/>
+          </a:prstGeom>
+        </p:spPr>
+        <p:style>
+          <a:lnRef idx="2">
+            <a:schemeClr val="dk1"/>
+          </a:lnRef>
+          <a:fillRef idx="1">
+            <a:schemeClr val="lt1"/>
+          </a:fillRef>
+          <a:effectRef idx="0">
+            <a:schemeClr val="dk1"/>
+          </a:effectRef>
+          <a:fontRef idx="minor">
+            <a:schemeClr val="dk1"/>
+          </a:fontRef>
+        </p:style>
+        <p:txBody>
+          <a:bodyPr rtlCol="0" anchor="ctr"/>
+          <a:lstStyle/>
+          <a:p>
+            <a:pPr algn="ctr"/>
+            <a:r>
+              <a:rPr lang="en-US" altLang="ko-KR" sz="1200"/>
+              <a:t>rnn cell</a:t>
+            </a:r>
+            <a:endParaRPr lang="ko-KR" altLang="en-US" sz="1200" dirty="0"/>
+          </a:p>
+        </p:txBody>
+      </p:sp>
+      <p:sp>
+        <p:nvSpPr>
+          <p:cNvPr id="55" name="직사각형 54">
+            <a:extLst>
+              <a:ext uri="{FF2B5EF4-FFF2-40B4-BE49-F238E27FC236}">
+                <a16:creationId xmlns:a16="http://schemas.microsoft.com/office/drawing/2014/main" id="{45734B14-436C-47C7-9687-58304E8617D1}"/>
+              </a:ext>
+            </a:extLst>
+          </p:cNvPr>
+          <p:cNvSpPr/>
+          <p:nvPr/>
+        </p:nvSpPr>
+        <p:spPr>
+          <a:xfrm>
+            <a:off x="4923564" y="4637902"/>
+            <a:ext cx="1025610" cy="518984"/>
+          </a:xfrm>
+          <a:prstGeom prst="rect">
+            <a:avLst/>
+          </a:prstGeom>
+        </p:spPr>
+        <p:style>
+          <a:lnRef idx="2">
+            <a:schemeClr val="dk1"/>
+          </a:lnRef>
+          <a:fillRef idx="1">
+            <a:schemeClr val="lt1"/>
+          </a:fillRef>
+          <a:effectRef idx="0">
+            <a:schemeClr val="dk1"/>
+          </a:effectRef>
+          <a:fontRef idx="minor">
+            <a:schemeClr val="dk1"/>
+          </a:fontRef>
+        </p:style>
+        <p:txBody>
+          <a:bodyPr rtlCol="0" anchor="ctr"/>
+          <a:lstStyle/>
+          <a:p>
+            <a:pPr algn="ctr"/>
+            <a:r>
+              <a:rPr lang="en-US" altLang="ko-KR" sz="1200" dirty="0"/>
+              <a:t>embedding</a:t>
+            </a:r>
+            <a:endParaRPr lang="ko-KR" altLang="en-US" sz="1200" dirty="0"/>
+          </a:p>
+        </p:txBody>
+      </p:sp>
+      <p:cxnSp>
+        <p:nvCxnSpPr>
+          <p:cNvPr id="56" name="직선 화살표 연결선 55">
+            <a:extLst>
+              <a:ext uri="{FF2B5EF4-FFF2-40B4-BE49-F238E27FC236}">
+                <a16:creationId xmlns:a16="http://schemas.microsoft.com/office/drawing/2014/main" id="{F145FA49-CD39-4A97-87A1-74A33C4F30BF}"/>
+              </a:ext>
+            </a:extLst>
+          </p:cNvPr>
+          <p:cNvCxnSpPr>
+            <a:stCxn id="55" idx="0"/>
+            <a:endCxn id="54" idx="2"/>
+          </p:cNvCxnSpPr>
+          <p:nvPr/>
+        </p:nvCxnSpPr>
+        <p:spPr>
+          <a:xfrm flipV="1">
+            <a:off x="5436369" y="4254843"/>
+            <a:ext cx="0" cy="383059"/>
+          </a:xfrm>
+          <a:prstGeom prst="straightConnector1">
+            <a:avLst/>
+          </a:prstGeom>
+          <a:ln>
+            <a:tailEnd type="triangle"/>
+          </a:ln>
+        </p:spPr>
+        <p:style>
+          <a:lnRef idx="2">
+            <a:schemeClr val="dk1"/>
+          </a:lnRef>
+          <a:fillRef idx="1">
+            <a:schemeClr val="lt1"/>
+          </a:fillRef>
+          <a:effectRef idx="0">
+            <a:schemeClr val="dk1"/>
+          </a:effectRef>
+          <a:fontRef idx="minor">
+            <a:schemeClr val="dk1"/>
+          </a:fontRef>
+        </p:style>
+      </p:cxnSp>
+      <p:cxnSp>
+        <p:nvCxnSpPr>
+          <p:cNvPr id="57" name="직선 화살표 연결선 56">
+            <a:extLst>
+              <a:ext uri="{FF2B5EF4-FFF2-40B4-BE49-F238E27FC236}">
+                <a16:creationId xmlns:a16="http://schemas.microsoft.com/office/drawing/2014/main" id="{DAE01F3F-CF81-4CE4-BC13-D6B43E5BFF5B}"/>
+              </a:ext>
+            </a:extLst>
+          </p:cNvPr>
+          <p:cNvCxnSpPr>
+            <a:cxnSpLocks/>
+            <a:stCxn id="54" idx="0"/>
+            <a:endCxn id="53" idx="2"/>
+          </p:cNvCxnSpPr>
+          <p:nvPr/>
+        </p:nvCxnSpPr>
+        <p:spPr>
+          <a:xfrm flipV="1">
+            <a:off x="5436369" y="3352800"/>
+            <a:ext cx="0" cy="383059"/>
+          </a:xfrm>
+          <a:prstGeom prst="straightConnector1">
+            <a:avLst/>
+          </a:prstGeom>
+          <a:ln>
+            <a:tailEnd type="triangle"/>
+          </a:ln>
+        </p:spPr>
+        <p:style>
+          <a:lnRef idx="2">
+            <a:schemeClr val="dk1"/>
+          </a:lnRef>
+          <a:fillRef idx="1">
+            <a:schemeClr val="lt1"/>
+          </a:fillRef>
+          <a:effectRef idx="0">
+            <a:schemeClr val="dk1"/>
+          </a:effectRef>
+          <a:fontRef idx="minor">
+            <a:schemeClr val="dk1"/>
+          </a:fontRef>
+        </p:style>
+      </p:cxnSp>
+      <p:cxnSp>
+        <p:nvCxnSpPr>
+          <p:cNvPr id="58" name="직선 화살표 연결선 57">
+            <a:extLst>
+              <a:ext uri="{FF2B5EF4-FFF2-40B4-BE49-F238E27FC236}">
+                <a16:creationId xmlns:a16="http://schemas.microsoft.com/office/drawing/2014/main" id="{375B0486-21D7-43C4-AF75-91F328A98605}"/>
+              </a:ext>
+            </a:extLst>
+          </p:cNvPr>
+          <p:cNvCxnSpPr>
+            <a:cxnSpLocks/>
+            <a:stCxn id="53" idx="0"/>
+            <a:endCxn id="52" idx="2"/>
+          </p:cNvCxnSpPr>
+          <p:nvPr/>
+        </p:nvCxnSpPr>
+        <p:spPr>
+          <a:xfrm flipV="1">
+            <a:off x="5436369" y="2450757"/>
+            <a:ext cx="0" cy="383059"/>
+          </a:xfrm>
+          <a:prstGeom prst="straightConnector1">
+            <a:avLst/>
+          </a:prstGeom>
+          <a:ln>
+            <a:tailEnd type="triangle"/>
+          </a:ln>
+        </p:spPr>
+        <p:style>
+          <a:lnRef idx="2">
+            <a:schemeClr val="dk1"/>
+          </a:lnRef>
+          <a:fillRef idx="1">
+            <a:schemeClr val="lt1"/>
+          </a:fillRef>
+          <a:effectRef idx="0">
+            <a:schemeClr val="dk1"/>
+          </a:effectRef>
+          <a:fontRef idx="minor">
+            <a:schemeClr val="dk1"/>
+          </a:fontRef>
+        </p:style>
+      </p:cxnSp>
+      <p:cxnSp>
+        <p:nvCxnSpPr>
+          <p:cNvPr id="59" name="직선 화살표 연결선 58">
+            <a:extLst>
+              <a:ext uri="{FF2B5EF4-FFF2-40B4-BE49-F238E27FC236}">
+                <a16:creationId xmlns:a16="http://schemas.microsoft.com/office/drawing/2014/main" id="{2BC46B70-F32F-4346-831E-1F87C0F860EB}"/>
+              </a:ext>
+            </a:extLst>
+          </p:cNvPr>
+          <p:cNvCxnSpPr>
+            <a:cxnSpLocks/>
+            <a:stCxn id="60" idx="0"/>
+            <a:endCxn id="55" idx="2"/>
+          </p:cNvCxnSpPr>
+          <p:nvPr/>
+        </p:nvCxnSpPr>
+        <p:spPr>
+          <a:xfrm flipV="1">
+            <a:off x="5436369" y="5156886"/>
+            <a:ext cx="0" cy="333634"/>
+          </a:xfrm>
+          <a:prstGeom prst="straightConnector1">
+            <a:avLst/>
+          </a:prstGeom>
+          <a:ln>
+            <a:tailEnd type="triangle"/>
+          </a:ln>
+        </p:spPr>
+        <p:style>
+          <a:lnRef idx="2">
+            <a:schemeClr val="dk1"/>
+          </a:lnRef>
+          <a:fillRef idx="1">
+            <a:schemeClr val="lt1"/>
+          </a:fillRef>
+          <a:effectRef idx="0">
+            <a:schemeClr val="dk1"/>
+          </a:effectRef>
+          <a:fontRef idx="minor">
+            <a:schemeClr val="dk1"/>
+          </a:fontRef>
+        </p:style>
+      </p:cxnSp>
+      <mc:AlternateContent xmlns:mc="http://schemas.openxmlformats.org/markup-compatibility/2006">
+        <mc:Choice xmlns:a14="http://schemas.microsoft.com/office/drawing/2010/main" Requires="a14">
+          <p:sp>
+            <p:nvSpPr>
+              <p:cNvPr id="60" name="TextBox 59">
+                <a:extLst>
+                  <a:ext uri="{FF2B5EF4-FFF2-40B4-BE49-F238E27FC236}">
+                    <a16:creationId xmlns:a16="http://schemas.microsoft.com/office/drawing/2014/main" id="{EA9AC0B1-A97C-4E8C-828A-86E4E70B2543}"/>
+                  </a:ext>
+                </a:extLst>
+              </p:cNvPr>
+              <p:cNvSpPr txBox="1"/>
+              <p:nvPr/>
+            </p:nvSpPr>
+            <p:spPr>
+              <a:xfrm>
+                <a:off x="5188897" y="5490520"/>
+                <a:ext cx="494943" cy="369332"/>
+              </a:xfrm>
+              <a:prstGeom prst="rect">
+                <a:avLst/>
+              </a:prstGeom>
+              <a:noFill/>
+            </p:spPr>
+            <p:txBody>
+              <a:bodyPr wrap="none" rtlCol="0">
+                <a:spAutoFit/>
+              </a:bodyPr>
+              <a:lstStyle/>
+              <a:p>
+                <a14:m>
+                  <m:oMathPara xmlns:m="http://schemas.openxmlformats.org/officeDocument/2006/math">
+                    <m:oMathParaPr>
+                      <m:jc m:val="centerGroup"/>
+                    </m:oMathParaPr>
+                    <m:oMath xmlns:m="http://schemas.openxmlformats.org/officeDocument/2006/math">
+                      <m:sSub>
+                        <m:sSubPr>
+                          <m:ctrlPr>
+                            <a:rPr lang="en-US" altLang="ko-KR" i="1" smtClean="0">
+                              <a:latin typeface="Cambria Math" panose="02040503050406030204" pitchFamily="18" charset="0"/>
+                            </a:rPr>
+                          </m:ctrlPr>
+                        </m:sSubPr>
+                        <m:e>
+                          <m:r>
+                            <a:rPr lang="en-US" altLang="ko-KR" b="0" i="1" smtClean="0">
+                              <a:latin typeface="Cambria Math" panose="02040503050406030204" pitchFamily="18" charset="0"/>
+                            </a:rPr>
+                            <m:t>𝑥</m:t>
+                          </m:r>
+                        </m:e>
+                        <m:sub>
+                          <m:r>
+                            <a:rPr lang="en-US" altLang="ko-KR" b="0" i="1" smtClean="0">
+                              <a:latin typeface="Cambria Math" panose="02040503050406030204" pitchFamily="18" charset="0"/>
+                            </a:rPr>
+                            <m:t>2</m:t>
+                          </m:r>
+                        </m:sub>
+                      </m:sSub>
+                    </m:oMath>
+                  </m:oMathPara>
+                </a14:m>
+                <a:endParaRPr lang="ko-KR" altLang="en-US" dirty="0"/>
+              </a:p>
+            </p:txBody>
+          </p:sp>
+        </mc:Choice>
+        <mc:Fallback>
+          <p:sp>
+            <p:nvSpPr>
+              <p:cNvPr id="60" name="TextBox 59">
+                <a:extLst>
+                  <a:ext uri="{FF2B5EF4-FFF2-40B4-BE49-F238E27FC236}">
+                    <a16:creationId xmlns:a16="http://schemas.microsoft.com/office/drawing/2014/main" id="{EA9AC0B1-A97C-4E8C-828A-86E4E70B2543}"/>
+                  </a:ext>
+                </a:extLst>
+              </p:cNvPr>
+              <p:cNvSpPr txBox="1">
+                <a:spLocks noRot="1" noChangeAspect="1" noMove="1" noResize="1" noEditPoints="1" noAdjustHandles="1" noChangeArrowheads="1" noChangeShapeType="1" noTextEdit="1"/>
+              </p:cNvSpPr>
+              <p:nvPr/>
+            </p:nvSpPr>
+            <p:spPr>
+              <a:xfrm>
+                <a:off x="5188897" y="5490520"/>
+                <a:ext cx="494943" cy="369332"/>
+              </a:xfrm>
+              <a:prstGeom prst="rect">
+                <a:avLst/>
+              </a:prstGeom>
+              <a:blipFill>
+                <a:blip r:embed="rId6"/>
+                <a:stretch>
+                  <a:fillRect b="-3333"/>
+                </a:stretch>
+              </a:blipFill>
+            </p:spPr>
+            <p:txBody>
+              <a:bodyPr/>
+              <a:lstStyle/>
+              <a:p>
+                <a:r>
+                  <a:rPr lang="ko-KR" altLang="en-US">
+                    <a:noFill/>
+                  </a:rPr>
+                  <a:t> </a:t>
+                </a:r>
+              </a:p>
+            </p:txBody>
+          </p:sp>
+        </mc:Fallback>
+      </mc:AlternateContent>
+      <mc:AlternateContent xmlns:mc="http://schemas.openxmlformats.org/markup-compatibility/2006">
+        <mc:Choice xmlns:a14="http://schemas.microsoft.com/office/drawing/2010/main" Requires="a14">
+          <p:sp>
+            <p:nvSpPr>
+              <p:cNvPr id="61" name="TextBox 60">
+                <a:extLst>
+                  <a:ext uri="{FF2B5EF4-FFF2-40B4-BE49-F238E27FC236}">
+                    <a16:creationId xmlns:a16="http://schemas.microsoft.com/office/drawing/2014/main" id="{D9396E0A-ECCE-4220-B28F-030A8191D168}"/>
+                  </a:ext>
+                </a:extLst>
+              </p:cNvPr>
+              <p:cNvSpPr txBox="1"/>
+              <p:nvPr/>
+            </p:nvSpPr>
+            <p:spPr>
+              <a:xfrm>
+                <a:off x="5194219" y="1228123"/>
+                <a:ext cx="494943" cy="369332"/>
+              </a:xfrm>
+              <a:prstGeom prst="rect">
+                <a:avLst/>
+              </a:prstGeom>
+              <a:noFill/>
+            </p:spPr>
+            <p:txBody>
+              <a:bodyPr wrap="none" rtlCol="0">
+                <a:spAutoFit/>
+              </a:bodyPr>
+              <a:lstStyle/>
+              <a:p>
+                <a14:m>
+                  <m:oMathPara xmlns:m="http://schemas.openxmlformats.org/officeDocument/2006/math">
+                    <m:oMathParaPr>
+                      <m:jc m:val="centerGroup"/>
+                    </m:oMathParaPr>
+                    <m:oMath xmlns:m="http://schemas.openxmlformats.org/officeDocument/2006/math">
+                      <m:sSub>
+                        <m:sSubPr>
+                          <m:ctrlPr>
+                            <a:rPr lang="en-US" altLang="ko-KR" i="1" smtClean="0">
+                              <a:latin typeface="Cambria Math" panose="02040503050406030204" pitchFamily="18" charset="0"/>
+                            </a:rPr>
+                          </m:ctrlPr>
+                        </m:sSubPr>
+                        <m:e>
+                          <m:acc>
+                            <m:accPr>
+                              <m:chr m:val="̂"/>
+                              <m:ctrlPr>
+                                <a:rPr lang="en-US" altLang="ko-KR" i="1" smtClean="0">
+                                  <a:latin typeface="Cambria Math" panose="02040503050406030204" pitchFamily="18" charset="0"/>
+                                </a:rPr>
+                              </m:ctrlPr>
+                            </m:accPr>
+                            <m:e>
+                              <m:r>
+                                <a:rPr lang="en-US" altLang="ko-KR" b="0" i="1" smtClean="0">
+                                  <a:latin typeface="Cambria Math" panose="02040503050406030204" pitchFamily="18" charset="0"/>
+                                </a:rPr>
+                                <m:t>𝑥</m:t>
+                              </m:r>
+                            </m:e>
+                          </m:acc>
+                        </m:e>
+                        <m:sub>
+                          <m:r>
+                            <a:rPr lang="en-US" altLang="ko-KR" b="0" i="1" smtClean="0">
+                              <a:latin typeface="Cambria Math" panose="02040503050406030204" pitchFamily="18" charset="0"/>
+                            </a:rPr>
+                            <m:t>3</m:t>
+                          </m:r>
+                        </m:sub>
+                      </m:sSub>
+                    </m:oMath>
+                  </m:oMathPara>
+                </a14:m>
+                <a:endParaRPr lang="ko-KR" altLang="en-US" dirty="0"/>
+              </a:p>
+            </p:txBody>
+          </p:sp>
+        </mc:Choice>
+        <mc:Fallback>
+          <p:sp>
+            <p:nvSpPr>
+              <p:cNvPr id="61" name="TextBox 60">
+                <a:extLst>
+                  <a:ext uri="{FF2B5EF4-FFF2-40B4-BE49-F238E27FC236}">
+                    <a16:creationId xmlns:a16="http://schemas.microsoft.com/office/drawing/2014/main" id="{D9396E0A-ECCE-4220-B28F-030A8191D168}"/>
+                  </a:ext>
+                </a:extLst>
+              </p:cNvPr>
+              <p:cNvSpPr txBox="1">
+                <a:spLocks noRot="1" noChangeAspect="1" noMove="1" noResize="1" noEditPoints="1" noAdjustHandles="1" noChangeArrowheads="1" noChangeShapeType="1" noTextEdit="1"/>
+              </p:cNvSpPr>
+              <p:nvPr/>
+            </p:nvSpPr>
+            <p:spPr>
+              <a:xfrm>
+                <a:off x="5194219" y="1228123"/>
+                <a:ext cx="494943" cy="369332"/>
+              </a:xfrm>
+              <a:prstGeom prst="rect">
+                <a:avLst/>
+              </a:prstGeom>
+              <a:blipFill>
+                <a:blip r:embed="rId7"/>
+                <a:stretch>
+                  <a:fillRect t="-3279" r="-14815" b="-1639"/>
+                </a:stretch>
+              </a:blipFill>
+            </p:spPr>
+            <p:txBody>
+              <a:bodyPr/>
+              <a:lstStyle/>
+              <a:p>
+                <a:r>
+                  <a:rPr lang="ko-KR" altLang="en-US">
+                    <a:noFill/>
+                  </a:rPr>
+                  <a:t> </a:t>
+                </a:r>
+              </a:p>
+            </p:txBody>
+          </p:sp>
+        </mc:Fallback>
+      </mc:AlternateContent>
+      <p:cxnSp>
+        <p:nvCxnSpPr>
+          <p:cNvPr id="62" name="직선 화살표 연결선 61">
+            <a:extLst>
+              <a:ext uri="{FF2B5EF4-FFF2-40B4-BE49-F238E27FC236}">
+                <a16:creationId xmlns:a16="http://schemas.microsoft.com/office/drawing/2014/main" id="{68762E48-EEF4-45E1-8BAA-FE017CC90266}"/>
+              </a:ext>
+            </a:extLst>
+          </p:cNvPr>
+          <p:cNvCxnSpPr>
+            <a:cxnSpLocks/>
+            <a:stCxn id="52" idx="0"/>
+            <a:endCxn id="61" idx="2"/>
+          </p:cNvCxnSpPr>
+          <p:nvPr/>
+        </p:nvCxnSpPr>
+        <p:spPr>
+          <a:xfrm flipV="1">
+            <a:off x="5436369" y="1597455"/>
+            <a:ext cx="5322" cy="334318"/>
+          </a:xfrm>
+          <a:prstGeom prst="straightConnector1">
+            <a:avLst/>
+          </a:prstGeom>
+          <a:ln>
+            <a:tailEnd type="triangle"/>
+          </a:ln>
+        </p:spPr>
+        <p:style>
+          <a:lnRef idx="2">
+            <a:schemeClr val="dk1"/>
+          </a:lnRef>
+          <a:fillRef idx="1">
+            <a:schemeClr val="lt1"/>
+          </a:fillRef>
+          <a:effectRef idx="0">
+            <a:schemeClr val="dk1"/>
+          </a:effectRef>
+          <a:fontRef idx="minor">
+            <a:schemeClr val="dk1"/>
+          </a:fontRef>
+        </p:style>
+      </p:cxnSp>
+      <p:sp>
+        <p:nvSpPr>
+          <p:cNvPr id="63" name="직사각형 62">
+            <a:extLst>
+              <a:ext uri="{FF2B5EF4-FFF2-40B4-BE49-F238E27FC236}">
+                <a16:creationId xmlns:a16="http://schemas.microsoft.com/office/drawing/2014/main" id="{0BE1403E-130A-46E4-ADB4-CAE5BD3B675A}"/>
+              </a:ext>
+            </a:extLst>
+          </p:cNvPr>
+          <p:cNvSpPr/>
+          <p:nvPr/>
+        </p:nvSpPr>
+        <p:spPr>
+          <a:xfrm>
+            <a:off x="6456657" y="1931773"/>
+            <a:ext cx="1025610" cy="518984"/>
+          </a:xfrm>
+          <a:prstGeom prst="rect">
+            <a:avLst/>
+          </a:prstGeom>
+        </p:spPr>
+        <p:style>
+          <a:lnRef idx="2">
+            <a:schemeClr val="dk1"/>
+          </a:lnRef>
+          <a:fillRef idx="1">
+            <a:schemeClr val="lt1"/>
+          </a:fillRef>
+          <a:effectRef idx="0">
+            <a:schemeClr val="dk1"/>
+          </a:effectRef>
+          <a:fontRef idx="minor">
+            <a:schemeClr val="dk1"/>
+          </a:fontRef>
+        </p:style>
+        <p:txBody>
+          <a:bodyPr rtlCol="0" anchor="ctr"/>
+          <a:lstStyle/>
+          <a:p>
+            <a:pPr algn="ctr"/>
+            <a:r>
+              <a:rPr lang="en-US" altLang="ko-KR" sz="1200" dirty="0" err="1"/>
+              <a:t>softmax</a:t>
+            </a:r>
+            <a:endParaRPr lang="ko-KR" altLang="en-US" sz="1200" dirty="0"/>
+          </a:p>
+        </p:txBody>
+      </p:sp>
+      <p:sp>
+        <p:nvSpPr>
+          <p:cNvPr id="64" name="직사각형 63">
+            <a:extLst>
+              <a:ext uri="{FF2B5EF4-FFF2-40B4-BE49-F238E27FC236}">
+                <a16:creationId xmlns:a16="http://schemas.microsoft.com/office/drawing/2014/main" id="{C759F013-57C3-4BE7-A358-BE89DB95B12F}"/>
+              </a:ext>
+            </a:extLst>
+          </p:cNvPr>
+          <p:cNvSpPr/>
+          <p:nvPr/>
+        </p:nvSpPr>
+        <p:spPr>
+          <a:xfrm>
+            <a:off x="6456657" y="2833816"/>
+            <a:ext cx="1025610" cy="518984"/>
+          </a:xfrm>
+          <a:prstGeom prst="rect">
+            <a:avLst/>
+          </a:prstGeom>
+        </p:spPr>
+        <p:style>
+          <a:lnRef idx="2">
+            <a:schemeClr val="dk1"/>
+          </a:lnRef>
+          <a:fillRef idx="1">
+            <a:schemeClr val="lt1"/>
+          </a:fillRef>
+          <a:effectRef idx="0">
+            <a:schemeClr val="dk1"/>
+          </a:effectRef>
+          <a:fontRef idx="minor">
+            <a:schemeClr val="dk1"/>
+          </a:fontRef>
+        </p:style>
+        <p:txBody>
+          <a:bodyPr rtlCol="0" anchor="ctr"/>
+          <a:lstStyle/>
+          <a:p>
+            <a:pPr algn="ctr"/>
+            <a:r>
+              <a:rPr lang="en-US" altLang="ko-KR" sz="1200" dirty="0" err="1"/>
+              <a:t>rnn</a:t>
+            </a:r>
+            <a:r>
+              <a:rPr lang="en-US" altLang="ko-KR" sz="1200" dirty="0"/>
+              <a:t> cell</a:t>
+            </a:r>
+            <a:endParaRPr lang="ko-KR" altLang="en-US" sz="1200" dirty="0"/>
+          </a:p>
+        </p:txBody>
+      </p:sp>
+      <p:sp>
+        <p:nvSpPr>
+          <p:cNvPr id="65" name="직사각형 64">
+            <a:extLst>
+              <a:ext uri="{FF2B5EF4-FFF2-40B4-BE49-F238E27FC236}">
+                <a16:creationId xmlns:a16="http://schemas.microsoft.com/office/drawing/2014/main" id="{1A6635F9-7041-4CFB-9DC3-50506B3D4C47}"/>
+              </a:ext>
+            </a:extLst>
+          </p:cNvPr>
+          <p:cNvSpPr/>
+          <p:nvPr/>
+        </p:nvSpPr>
+        <p:spPr>
+          <a:xfrm>
+            <a:off x="6456657" y="3735859"/>
+            <a:ext cx="1025610" cy="518984"/>
+          </a:xfrm>
+          <a:prstGeom prst="rect">
+            <a:avLst/>
+          </a:prstGeom>
+        </p:spPr>
+        <p:style>
+          <a:lnRef idx="2">
+            <a:schemeClr val="dk1"/>
+          </a:lnRef>
+          <a:fillRef idx="1">
+            <a:schemeClr val="lt1"/>
+          </a:fillRef>
+          <a:effectRef idx="0">
+            <a:schemeClr val="dk1"/>
+          </a:effectRef>
+          <a:fontRef idx="minor">
+            <a:schemeClr val="dk1"/>
+          </a:fontRef>
+        </p:style>
+        <p:txBody>
+          <a:bodyPr rtlCol="0" anchor="ctr"/>
+          <a:lstStyle/>
+          <a:p>
+            <a:pPr algn="ctr"/>
+            <a:r>
+              <a:rPr lang="en-US" altLang="ko-KR" sz="1200"/>
+              <a:t>rnn cell</a:t>
+            </a:r>
+            <a:endParaRPr lang="ko-KR" altLang="en-US" sz="1200" dirty="0"/>
+          </a:p>
+        </p:txBody>
+      </p:sp>
+      <p:sp>
+        <p:nvSpPr>
+          <p:cNvPr id="66" name="직사각형 65">
+            <a:extLst>
+              <a:ext uri="{FF2B5EF4-FFF2-40B4-BE49-F238E27FC236}">
+                <a16:creationId xmlns:a16="http://schemas.microsoft.com/office/drawing/2014/main" id="{A31DED44-B728-4C24-8199-2AC9E40EF17A}"/>
+              </a:ext>
+            </a:extLst>
+          </p:cNvPr>
+          <p:cNvSpPr/>
+          <p:nvPr/>
+        </p:nvSpPr>
+        <p:spPr>
+          <a:xfrm>
+            <a:off x="6456657" y="4637902"/>
+            <a:ext cx="1025610" cy="518984"/>
+          </a:xfrm>
+          <a:prstGeom prst="rect">
+            <a:avLst/>
+          </a:prstGeom>
+        </p:spPr>
+        <p:style>
+          <a:lnRef idx="2">
+            <a:schemeClr val="dk1"/>
+          </a:lnRef>
+          <a:fillRef idx="1">
+            <a:schemeClr val="lt1"/>
+          </a:fillRef>
+          <a:effectRef idx="0">
+            <a:schemeClr val="dk1"/>
+          </a:effectRef>
+          <a:fontRef idx="minor">
+            <a:schemeClr val="dk1"/>
+          </a:fontRef>
+        </p:style>
+        <p:txBody>
+          <a:bodyPr rtlCol="0" anchor="ctr"/>
+          <a:lstStyle/>
+          <a:p>
+            <a:pPr algn="ctr"/>
+            <a:r>
+              <a:rPr lang="en-US" altLang="ko-KR" sz="1200" dirty="0"/>
+              <a:t>embedding</a:t>
+            </a:r>
+            <a:endParaRPr lang="ko-KR" altLang="en-US" sz="1200" dirty="0"/>
+          </a:p>
+        </p:txBody>
+      </p:sp>
+      <p:cxnSp>
+        <p:nvCxnSpPr>
+          <p:cNvPr id="67" name="직선 화살표 연결선 66">
+            <a:extLst>
+              <a:ext uri="{FF2B5EF4-FFF2-40B4-BE49-F238E27FC236}">
+                <a16:creationId xmlns:a16="http://schemas.microsoft.com/office/drawing/2014/main" id="{891AADFE-0883-4089-8AB9-267149A7E3D8}"/>
+              </a:ext>
+            </a:extLst>
+          </p:cNvPr>
+          <p:cNvCxnSpPr>
+            <a:stCxn id="66" idx="0"/>
+            <a:endCxn id="65" idx="2"/>
+          </p:cNvCxnSpPr>
+          <p:nvPr/>
+        </p:nvCxnSpPr>
+        <p:spPr>
+          <a:xfrm flipV="1">
+            <a:off x="6969462" y="4254843"/>
+            <a:ext cx="0" cy="383059"/>
+          </a:xfrm>
+          <a:prstGeom prst="straightConnector1">
+            <a:avLst/>
+          </a:prstGeom>
+          <a:ln>
+            <a:tailEnd type="triangle"/>
+          </a:ln>
+        </p:spPr>
+        <p:style>
+          <a:lnRef idx="2">
+            <a:schemeClr val="dk1"/>
+          </a:lnRef>
+          <a:fillRef idx="1">
+            <a:schemeClr val="lt1"/>
+          </a:fillRef>
+          <a:effectRef idx="0">
+            <a:schemeClr val="dk1"/>
+          </a:effectRef>
+          <a:fontRef idx="minor">
+            <a:schemeClr val="dk1"/>
+          </a:fontRef>
+        </p:style>
+      </p:cxnSp>
+      <p:cxnSp>
+        <p:nvCxnSpPr>
+          <p:cNvPr id="68" name="직선 화살표 연결선 67">
+            <a:extLst>
+              <a:ext uri="{FF2B5EF4-FFF2-40B4-BE49-F238E27FC236}">
+                <a16:creationId xmlns:a16="http://schemas.microsoft.com/office/drawing/2014/main" id="{69E3E16B-3F0F-471F-A8DB-0FEF2FE2419A}"/>
+              </a:ext>
+            </a:extLst>
+          </p:cNvPr>
+          <p:cNvCxnSpPr>
+            <a:cxnSpLocks/>
+            <a:stCxn id="65" idx="0"/>
+            <a:endCxn id="64" idx="2"/>
+          </p:cNvCxnSpPr>
+          <p:nvPr/>
+        </p:nvCxnSpPr>
+        <p:spPr>
+          <a:xfrm flipV="1">
+            <a:off x="6969462" y="3352800"/>
+            <a:ext cx="0" cy="383059"/>
+          </a:xfrm>
+          <a:prstGeom prst="straightConnector1">
+            <a:avLst/>
+          </a:prstGeom>
+          <a:ln>
+            <a:tailEnd type="triangle"/>
+          </a:ln>
+        </p:spPr>
+        <p:style>
+          <a:lnRef idx="2">
+            <a:schemeClr val="dk1"/>
+          </a:lnRef>
+          <a:fillRef idx="1">
+            <a:schemeClr val="lt1"/>
+          </a:fillRef>
+          <a:effectRef idx="0">
+            <a:schemeClr val="dk1"/>
+          </a:effectRef>
+          <a:fontRef idx="minor">
+            <a:schemeClr val="dk1"/>
+          </a:fontRef>
+        </p:style>
+      </p:cxnSp>
+      <p:cxnSp>
+        <p:nvCxnSpPr>
+          <p:cNvPr id="69" name="직선 화살표 연결선 68">
+            <a:extLst>
+              <a:ext uri="{FF2B5EF4-FFF2-40B4-BE49-F238E27FC236}">
+                <a16:creationId xmlns:a16="http://schemas.microsoft.com/office/drawing/2014/main" id="{B6EC31CE-6194-47F2-BA5A-4BFC5CBD7C4A}"/>
+              </a:ext>
+            </a:extLst>
+          </p:cNvPr>
+          <p:cNvCxnSpPr>
+            <a:cxnSpLocks/>
+            <a:stCxn id="64" idx="0"/>
+            <a:endCxn id="63" idx="2"/>
+          </p:cNvCxnSpPr>
+          <p:nvPr/>
+        </p:nvCxnSpPr>
+        <p:spPr>
+          <a:xfrm flipV="1">
+            <a:off x="6969462" y="2450757"/>
+            <a:ext cx="0" cy="383059"/>
+          </a:xfrm>
+          <a:prstGeom prst="straightConnector1">
+            <a:avLst/>
+          </a:prstGeom>
+          <a:ln>
+            <a:tailEnd type="triangle"/>
+          </a:ln>
+        </p:spPr>
+        <p:style>
+          <a:lnRef idx="2">
+            <a:schemeClr val="dk1"/>
+          </a:lnRef>
+          <a:fillRef idx="1">
+            <a:schemeClr val="lt1"/>
+          </a:fillRef>
+          <a:effectRef idx="0">
+            <a:schemeClr val="dk1"/>
+          </a:effectRef>
+          <a:fontRef idx="minor">
+            <a:schemeClr val="dk1"/>
+          </a:fontRef>
+        </p:style>
+      </p:cxnSp>
+      <p:cxnSp>
+        <p:nvCxnSpPr>
+          <p:cNvPr id="70" name="직선 화살표 연결선 69">
+            <a:extLst>
+              <a:ext uri="{FF2B5EF4-FFF2-40B4-BE49-F238E27FC236}">
+                <a16:creationId xmlns:a16="http://schemas.microsoft.com/office/drawing/2014/main" id="{5C9CF6E8-BC52-4246-96EA-204ADC083BB0}"/>
+              </a:ext>
+            </a:extLst>
+          </p:cNvPr>
+          <p:cNvCxnSpPr>
+            <a:cxnSpLocks/>
+            <a:stCxn id="71" idx="0"/>
+            <a:endCxn id="66" idx="2"/>
+          </p:cNvCxnSpPr>
+          <p:nvPr/>
+        </p:nvCxnSpPr>
+        <p:spPr>
+          <a:xfrm flipV="1">
+            <a:off x="6969462" y="5156886"/>
+            <a:ext cx="0" cy="333634"/>
+          </a:xfrm>
+          <a:prstGeom prst="straightConnector1">
+            <a:avLst/>
+          </a:prstGeom>
+          <a:ln>
+            <a:tailEnd type="triangle"/>
+          </a:ln>
+        </p:spPr>
+        <p:style>
+          <a:lnRef idx="2">
+            <a:schemeClr val="dk1"/>
+          </a:lnRef>
+          <a:fillRef idx="1">
+            <a:schemeClr val="lt1"/>
+          </a:fillRef>
+          <a:effectRef idx="0">
+            <a:schemeClr val="dk1"/>
+          </a:effectRef>
+          <a:fontRef idx="minor">
+            <a:schemeClr val="dk1"/>
+          </a:fontRef>
+        </p:style>
+      </p:cxnSp>
+      <mc:AlternateContent xmlns:mc="http://schemas.openxmlformats.org/markup-compatibility/2006">
+        <mc:Choice xmlns:a14="http://schemas.microsoft.com/office/drawing/2010/main" Requires="a14">
+          <p:sp>
+            <p:nvSpPr>
+              <p:cNvPr id="71" name="TextBox 70">
+                <a:extLst>
+                  <a:ext uri="{FF2B5EF4-FFF2-40B4-BE49-F238E27FC236}">
+                    <a16:creationId xmlns:a16="http://schemas.microsoft.com/office/drawing/2014/main" id="{2484552F-1BD5-4D19-9F40-9E273BB6EC49}"/>
+                  </a:ext>
+                </a:extLst>
+              </p:cNvPr>
+              <p:cNvSpPr txBox="1"/>
+              <p:nvPr/>
+            </p:nvSpPr>
+            <p:spPr>
+              <a:xfrm>
+                <a:off x="6721990" y="5490520"/>
+                <a:ext cx="494943" cy="369332"/>
+              </a:xfrm>
+              <a:prstGeom prst="rect">
+                <a:avLst/>
+              </a:prstGeom>
+              <a:noFill/>
+            </p:spPr>
+            <p:txBody>
+              <a:bodyPr wrap="none" rtlCol="0">
+                <a:spAutoFit/>
+              </a:bodyPr>
+              <a:lstStyle/>
+              <a:p>
+                <a14:m>
+                  <m:oMathPara xmlns:m="http://schemas.openxmlformats.org/officeDocument/2006/math">
+                    <m:oMathParaPr>
+                      <m:jc m:val="centerGroup"/>
+                    </m:oMathParaPr>
+                    <m:oMath xmlns:m="http://schemas.openxmlformats.org/officeDocument/2006/math">
+                      <m:sSub>
+                        <m:sSubPr>
+                          <m:ctrlPr>
+                            <a:rPr lang="en-US" altLang="ko-KR" i="1" smtClean="0">
+                              <a:latin typeface="Cambria Math" panose="02040503050406030204" pitchFamily="18" charset="0"/>
+                            </a:rPr>
+                          </m:ctrlPr>
+                        </m:sSubPr>
+                        <m:e>
+                          <m:r>
+                            <a:rPr lang="en-US" altLang="ko-KR" b="0" i="1" smtClean="0">
+                              <a:latin typeface="Cambria Math" panose="02040503050406030204" pitchFamily="18" charset="0"/>
+                            </a:rPr>
+                            <m:t>𝑥</m:t>
+                          </m:r>
+                        </m:e>
+                        <m:sub>
+                          <m:r>
+                            <a:rPr lang="en-US" altLang="ko-KR" b="0" i="1" smtClean="0">
+                              <a:latin typeface="Cambria Math" panose="02040503050406030204" pitchFamily="18" charset="0"/>
+                            </a:rPr>
+                            <m:t>3</m:t>
+                          </m:r>
+                        </m:sub>
+                      </m:sSub>
+                    </m:oMath>
+                  </m:oMathPara>
+                </a14:m>
+                <a:endParaRPr lang="ko-KR" altLang="en-US" dirty="0"/>
+              </a:p>
+            </p:txBody>
+          </p:sp>
+        </mc:Choice>
+        <mc:Fallback>
+          <p:sp>
+            <p:nvSpPr>
+              <p:cNvPr id="71" name="TextBox 70">
+                <a:extLst>
+                  <a:ext uri="{FF2B5EF4-FFF2-40B4-BE49-F238E27FC236}">
+                    <a16:creationId xmlns:a16="http://schemas.microsoft.com/office/drawing/2014/main" id="{2484552F-1BD5-4D19-9F40-9E273BB6EC49}"/>
+                  </a:ext>
+                </a:extLst>
+              </p:cNvPr>
+              <p:cNvSpPr txBox="1">
+                <a:spLocks noRot="1" noChangeAspect="1" noMove="1" noResize="1" noEditPoints="1" noAdjustHandles="1" noChangeArrowheads="1" noChangeShapeType="1" noTextEdit="1"/>
+              </p:cNvSpPr>
+              <p:nvPr/>
+            </p:nvSpPr>
+            <p:spPr>
+              <a:xfrm>
+                <a:off x="6721990" y="5490520"/>
+                <a:ext cx="494943" cy="369332"/>
+              </a:xfrm>
+              <a:prstGeom prst="rect">
+                <a:avLst/>
+              </a:prstGeom>
+              <a:blipFill>
+                <a:blip r:embed="rId8"/>
+                <a:stretch>
+                  <a:fillRect b="-3333"/>
+                </a:stretch>
+              </a:blipFill>
+            </p:spPr>
+            <p:txBody>
+              <a:bodyPr/>
+              <a:lstStyle/>
+              <a:p>
+                <a:r>
+                  <a:rPr lang="ko-KR" altLang="en-US">
+                    <a:noFill/>
+                  </a:rPr>
+                  <a:t> </a:t>
+                </a:r>
+              </a:p>
+            </p:txBody>
+          </p:sp>
+        </mc:Fallback>
+      </mc:AlternateContent>
+      <mc:AlternateContent xmlns:mc="http://schemas.openxmlformats.org/markup-compatibility/2006">
+        <mc:Choice xmlns:a14="http://schemas.microsoft.com/office/drawing/2010/main" Requires="a14">
+          <p:sp>
+            <p:nvSpPr>
+              <p:cNvPr id="72" name="TextBox 71">
+                <a:extLst>
+                  <a:ext uri="{FF2B5EF4-FFF2-40B4-BE49-F238E27FC236}">
+                    <a16:creationId xmlns:a16="http://schemas.microsoft.com/office/drawing/2014/main" id="{3AEED8C7-9C0F-43FB-B869-3B3F190169C4}"/>
+                  </a:ext>
+                </a:extLst>
+              </p:cNvPr>
+              <p:cNvSpPr txBox="1"/>
+              <p:nvPr/>
+            </p:nvSpPr>
+            <p:spPr>
+              <a:xfrm>
+                <a:off x="6727312" y="1228123"/>
+                <a:ext cx="494943" cy="369332"/>
+              </a:xfrm>
+              <a:prstGeom prst="rect">
+                <a:avLst/>
+              </a:prstGeom>
+              <a:noFill/>
+            </p:spPr>
+            <p:txBody>
+              <a:bodyPr wrap="none" rtlCol="0">
+                <a:spAutoFit/>
+              </a:bodyPr>
+              <a:lstStyle/>
+              <a:p>
+                <a14:m>
+                  <m:oMathPara xmlns:m="http://schemas.openxmlformats.org/officeDocument/2006/math">
+                    <m:oMathParaPr>
+                      <m:jc m:val="centerGroup"/>
+                    </m:oMathParaPr>
+                    <m:oMath xmlns:m="http://schemas.openxmlformats.org/officeDocument/2006/math">
+                      <m:sSub>
+                        <m:sSubPr>
+                          <m:ctrlPr>
+                            <a:rPr lang="en-US" altLang="ko-KR" i="1" smtClean="0">
+                              <a:latin typeface="Cambria Math" panose="02040503050406030204" pitchFamily="18" charset="0"/>
+                            </a:rPr>
+                          </m:ctrlPr>
+                        </m:sSubPr>
+                        <m:e>
+                          <m:acc>
+                            <m:accPr>
+                              <m:chr m:val="̂"/>
+                              <m:ctrlPr>
+                                <a:rPr lang="en-US" altLang="ko-KR" i="1" smtClean="0">
+                                  <a:latin typeface="Cambria Math" panose="02040503050406030204" pitchFamily="18" charset="0"/>
+                                </a:rPr>
+                              </m:ctrlPr>
+                            </m:accPr>
+                            <m:e>
+                              <m:r>
+                                <a:rPr lang="en-US" altLang="ko-KR" b="0" i="1" smtClean="0">
+                                  <a:latin typeface="Cambria Math" panose="02040503050406030204" pitchFamily="18" charset="0"/>
+                                </a:rPr>
+                                <m:t>𝑥</m:t>
+                              </m:r>
+                            </m:e>
+                          </m:acc>
+                        </m:e>
+                        <m:sub>
+                          <m:r>
+                            <a:rPr lang="en-US" altLang="ko-KR" b="0" i="1" smtClean="0">
+                              <a:latin typeface="Cambria Math" panose="02040503050406030204" pitchFamily="18" charset="0"/>
+                            </a:rPr>
+                            <m:t>4</m:t>
+                          </m:r>
+                        </m:sub>
+                      </m:sSub>
+                    </m:oMath>
+                  </m:oMathPara>
+                </a14:m>
+                <a:endParaRPr lang="ko-KR" altLang="en-US" dirty="0"/>
+              </a:p>
+            </p:txBody>
+          </p:sp>
+        </mc:Choice>
+        <mc:Fallback>
+          <p:sp>
+            <p:nvSpPr>
+              <p:cNvPr id="72" name="TextBox 71">
+                <a:extLst>
+                  <a:ext uri="{FF2B5EF4-FFF2-40B4-BE49-F238E27FC236}">
+                    <a16:creationId xmlns:a16="http://schemas.microsoft.com/office/drawing/2014/main" id="{3AEED8C7-9C0F-43FB-B869-3B3F190169C4}"/>
+                  </a:ext>
+                </a:extLst>
+              </p:cNvPr>
+              <p:cNvSpPr txBox="1">
+                <a:spLocks noRot="1" noChangeAspect="1" noMove="1" noResize="1" noEditPoints="1" noAdjustHandles="1" noChangeArrowheads="1" noChangeShapeType="1" noTextEdit="1"/>
+              </p:cNvSpPr>
+              <p:nvPr/>
+            </p:nvSpPr>
+            <p:spPr>
+              <a:xfrm>
+                <a:off x="6727312" y="1228123"/>
+                <a:ext cx="494943" cy="369332"/>
+              </a:xfrm>
+              <a:prstGeom prst="rect">
+                <a:avLst/>
+              </a:prstGeom>
+              <a:blipFill>
+                <a:blip r:embed="rId9"/>
+                <a:stretch>
+                  <a:fillRect t="-3279" r="-13580" b="-1639"/>
+                </a:stretch>
+              </a:blipFill>
+            </p:spPr>
+            <p:txBody>
+              <a:bodyPr/>
+              <a:lstStyle/>
+              <a:p>
+                <a:r>
+                  <a:rPr lang="ko-KR" altLang="en-US">
+                    <a:noFill/>
+                  </a:rPr>
+                  <a:t> </a:t>
+                </a:r>
+              </a:p>
+            </p:txBody>
+          </p:sp>
+        </mc:Fallback>
+      </mc:AlternateContent>
+      <p:cxnSp>
+        <p:nvCxnSpPr>
+          <p:cNvPr id="73" name="직선 화살표 연결선 72">
+            <a:extLst>
+              <a:ext uri="{FF2B5EF4-FFF2-40B4-BE49-F238E27FC236}">
+                <a16:creationId xmlns:a16="http://schemas.microsoft.com/office/drawing/2014/main" id="{1D07BEB5-CC12-4374-B141-2883C46F0D31}"/>
+              </a:ext>
+            </a:extLst>
+          </p:cNvPr>
+          <p:cNvCxnSpPr>
+            <a:cxnSpLocks/>
+            <a:stCxn id="63" idx="0"/>
+            <a:endCxn id="72" idx="2"/>
+          </p:cNvCxnSpPr>
+          <p:nvPr/>
+        </p:nvCxnSpPr>
+        <p:spPr>
+          <a:xfrm flipV="1">
+            <a:off x="6969462" y="1597455"/>
+            <a:ext cx="5322" cy="334318"/>
+          </a:xfrm>
+          <a:prstGeom prst="straightConnector1">
+            <a:avLst/>
+          </a:prstGeom>
+          <a:ln>
+            <a:tailEnd type="triangle"/>
+          </a:ln>
+        </p:spPr>
+        <p:style>
+          <a:lnRef idx="2">
+            <a:schemeClr val="dk1"/>
+          </a:lnRef>
+          <a:fillRef idx="1">
+            <a:schemeClr val="lt1"/>
+          </a:fillRef>
+          <a:effectRef idx="0">
+            <a:schemeClr val="dk1"/>
+          </a:effectRef>
+          <a:fontRef idx="minor">
+            <a:schemeClr val="dk1"/>
+          </a:fontRef>
+        </p:style>
+      </p:cxnSp>
+      <p:sp>
+        <p:nvSpPr>
+          <p:cNvPr id="74" name="직사각형 73">
+            <a:extLst>
+              <a:ext uri="{FF2B5EF4-FFF2-40B4-BE49-F238E27FC236}">
+                <a16:creationId xmlns:a16="http://schemas.microsoft.com/office/drawing/2014/main" id="{1FFADF56-EE84-46B8-BBE0-94A19DDF6E46}"/>
+              </a:ext>
+            </a:extLst>
+          </p:cNvPr>
+          <p:cNvSpPr/>
+          <p:nvPr/>
+        </p:nvSpPr>
+        <p:spPr>
+          <a:xfrm>
+            <a:off x="7985932" y="1931773"/>
+            <a:ext cx="1025610" cy="518984"/>
+          </a:xfrm>
+          <a:prstGeom prst="rect">
+            <a:avLst/>
+          </a:prstGeom>
+        </p:spPr>
+        <p:style>
+          <a:lnRef idx="2">
+            <a:schemeClr val="dk1"/>
+          </a:lnRef>
+          <a:fillRef idx="1">
+            <a:schemeClr val="lt1"/>
+          </a:fillRef>
+          <a:effectRef idx="0">
+            <a:schemeClr val="dk1"/>
+          </a:effectRef>
+          <a:fontRef idx="minor">
+            <a:schemeClr val="dk1"/>
+          </a:fontRef>
+        </p:style>
+        <p:txBody>
+          <a:bodyPr rtlCol="0" anchor="ctr"/>
+          <a:lstStyle/>
+          <a:p>
+            <a:pPr algn="ctr"/>
+            <a:r>
+              <a:rPr lang="en-US" altLang="ko-KR" sz="1200" dirty="0" err="1"/>
+              <a:t>softmax</a:t>
+            </a:r>
+            <a:endParaRPr lang="ko-KR" altLang="en-US" sz="1200" dirty="0"/>
+          </a:p>
+        </p:txBody>
+      </p:sp>
+      <p:sp>
+        <p:nvSpPr>
+          <p:cNvPr id="75" name="직사각형 74">
+            <a:extLst>
+              <a:ext uri="{FF2B5EF4-FFF2-40B4-BE49-F238E27FC236}">
+                <a16:creationId xmlns:a16="http://schemas.microsoft.com/office/drawing/2014/main" id="{552D2A52-F3FF-41F3-A62E-C512BACEEF86}"/>
+              </a:ext>
+            </a:extLst>
+          </p:cNvPr>
+          <p:cNvSpPr/>
+          <p:nvPr/>
+        </p:nvSpPr>
+        <p:spPr>
+          <a:xfrm>
+            <a:off x="7985932" y="2833816"/>
+            <a:ext cx="1025610" cy="518984"/>
+          </a:xfrm>
+          <a:prstGeom prst="rect">
+            <a:avLst/>
+          </a:prstGeom>
+        </p:spPr>
+        <p:style>
+          <a:lnRef idx="2">
+            <a:schemeClr val="dk1"/>
+          </a:lnRef>
+          <a:fillRef idx="1">
+            <a:schemeClr val="lt1"/>
+          </a:fillRef>
+          <a:effectRef idx="0">
+            <a:schemeClr val="dk1"/>
+          </a:effectRef>
+          <a:fontRef idx="minor">
+            <a:schemeClr val="dk1"/>
+          </a:fontRef>
+        </p:style>
+        <p:txBody>
+          <a:bodyPr rtlCol="0" anchor="ctr"/>
+          <a:lstStyle/>
+          <a:p>
+            <a:pPr algn="ctr"/>
+            <a:r>
+              <a:rPr lang="en-US" altLang="ko-KR" sz="1200" dirty="0" err="1"/>
+              <a:t>rnn</a:t>
+            </a:r>
+            <a:r>
+              <a:rPr lang="en-US" altLang="ko-KR" sz="1200" dirty="0"/>
+              <a:t> cell</a:t>
+            </a:r>
+            <a:endParaRPr lang="ko-KR" altLang="en-US" sz="1200" dirty="0"/>
+          </a:p>
+        </p:txBody>
+      </p:sp>
+      <p:sp>
+        <p:nvSpPr>
+          <p:cNvPr id="76" name="직사각형 75">
+            <a:extLst>
+              <a:ext uri="{FF2B5EF4-FFF2-40B4-BE49-F238E27FC236}">
+                <a16:creationId xmlns:a16="http://schemas.microsoft.com/office/drawing/2014/main" id="{68DCAE8C-C0CC-4FF6-840E-5137C7726B0F}"/>
+              </a:ext>
+            </a:extLst>
+          </p:cNvPr>
+          <p:cNvSpPr/>
+          <p:nvPr/>
+        </p:nvSpPr>
+        <p:spPr>
+          <a:xfrm>
+            <a:off x="7985932" y="3735859"/>
+            <a:ext cx="1025610" cy="518984"/>
+          </a:xfrm>
+          <a:prstGeom prst="rect">
+            <a:avLst/>
+          </a:prstGeom>
+        </p:spPr>
+        <p:style>
+          <a:lnRef idx="2">
+            <a:schemeClr val="dk1"/>
+          </a:lnRef>
+          <a:fillRef idx="1">
+            <a:schemeClr val="lt1"/>
+          </a:fillRef>
+          <a:effectRef idx="0">
+            <a:schemeClr val="dk1"/>
+          </a:effectRef>
+          <a:fontRef idx="minor">
+            <a:schemeClr val="dk1"/>
+          </a:fontRef>
+        </p:style>
+        <p:txBody>
+          <a:bodyPr rtlCol="0" anchor="ctr"/>
+          <a:lstStyle/>
+          <a:p>
+            <a:pPr algn="ctr"/>
+            <a:r>
+              <a:rPr lang="en-US" altLang="ko-KR" sz="1200" dirty="0" err="1"/>
+              <a:t>rnn</a:t>
+            </a:r>
+            <a:r>
+              <a:rPr lang="en-US" altLang="ko-KR" sz="1200" dirty="0"/>
+              <a:t> cell</a:t>
+            </a:r>
+            <a:endParaRPr lang="ko-KR" altLang="en-US" sz="1200" dirty="0"/>
+          </a:p>
+        </p:txBody>
+      </p:sp>
+      <p:sp>
+        <p:nvSpPr>
+          <p:cNvPr id="77" name="직사각형 76">
+            <a:extLst>
+              <a:ext uri="{FF2B5EF4-FFF2-40B4-BE49-F238E27FC236}">
+                <a16:creationId xmlns:a16="http://schemas.microsoft.com/office/drawing/2014/main" id="{39D48891-5979-462A-9E6F-DF436D67435B}"/>
+              </a:ext>
+            </a:extLst>
+          </p:cNvPr>
+          <p:cNvSpPr/>
+          <p:nvPr/>
+        </p:nvSpPr>
+        <p:spPr>
+          <a:xfrm>
+            <a:off x="7985932" y="4637902"/>
+            <a:ext cx="1025610" cy="518984"/>
+          </a:xfrm>
+          <a:prstGeom prst="rect">
+            <a:avLst/>
+          </a:prstGeom>
+        </p:spPr>
+        <p:style>
+          <a:lnRef idx="2">
+            <a:schemeClr val="dk1"/>
+          </a:lnRef>
+          <a:fillRef idx="1">
+            <a:schemeClr val="lt1"/>
+          </a:fillRef>
+          <a:effectRef idx="0">
+            <a:schemeClr val="dk1"/>
+          </a:effectRef>
+          <a:fontRef idx="minor">
+            <a:schemeClr val="dk1"/>
+          </a:fontRef>
+        </p:style>
+        <p:txBody>
+          <a:bodyPr rtlCol="0" anchor="ctr"/>
+          <a:lstStyle/>
+          <a:p>
+            <a:pPr algn="ctr"/>
+            <a:r>
+              <a:rPr lang="en-US" altLang="ko-KR" sz="1200" dirty="0"/>
+              <a:t>embedding</a:t>
+            </a:r>
+            <a:endParaRPr lang="ko-KR" altLang="en-US" sz="1200" dirty="0"/>
+          </a:p>
+        </p:txBody>
+      </p:sp>
+      <p:cxnSp>
+        <p:nvCxnSpPr>
+          <p:cNvPr id="78" name="직선 화살표 연결선 77">
+            <a:extLst>
+              <a:ext uri="{FF2B5EF4-FFF2-40B4-BE49-F238E27FC236}">
+                <a16:creationId xmlns:a16="http://schemas.microsoft.com/office/drawing/2014/main" id="{44259613-4666-4808-81BE-AF79241707FD}"/>
+              </a:ext>
+            </a:extLst>
+          </p:cNvPr>
+          <p:cNvCxnSpPr>
+            <a:stCxn id="77" idx="0"/>
+            <a:endCxn id="76" idx="2"/>
+          </p:cNvCxnSpPr>
+          <p:nvPr/>
+        </p:nvCxnSpPr>
+        <p:spPr>
+          <a:xfrm flipV="1">
+            <a:off x="8498737" y="4254843"/>
+            <a:ext cx="0" cy="383059"/>
+          </a:xfrm>
+          <a:prstGeom prst="straightConnector1">
+            <a:avLst/>
+          </a:prstGeom>
+          <a:ln>
+            <a:tailEnd type="triangle"/>
+          </a:ln>
+        </p:spPr>
+        <p:style>
+          <a:lnRef idx="2">
+            <a:schemeClr val="dk1"/>
+          </a:lnRef>
+          <a:fillRef idx="1">
+            <a:schemeClr val="lt1"/>
+          </a:fillRef>
+          <a:effectRef idx="0">
+            <a:schemeClr val="dk1"/>
+          </a:effectRef>
+          <a:fontRef idx="minor">
+            <a:schemeClr val="dk1"/>
+          </a:fontRef>
+        </p:style>
+      </p:cxnSp>
+      <p:cxnSp>
+        <p:nvCxnSpPr>
+          <p:cNvPr id="79" name="직선 화살표 연결선 78">
+            <a:extLst>
+              <a:ext uri="{FF2B5EF4-FFF2-40B4-BE49-F238E27FC236}">
+                <a16:creationId xmlns:a16="http://schemas.microsoft.com/office/drawing/2014/main" id="{48E5987F-0185-4602-8583-E14C15AE7D5F}"/>
+              </a:ext>
+            </a:extLst>
+          </p:cNvPr>
+          <p:cNvCxnSpPr>
+            <a:cxnSpLocks/>
+            <a:stCxn id="76" idx="0"/>
+            <a:endCxn id="75" idx="2"/>
+          </p:cNvCxnSpPr>
+          <p:nvPr/>
+        </p:nvCxnSpPr>
+        <p:spPr>
+          <a:xfrm flipV="1">
+            <a:off x="8498737" y="3352800"/>
+            <a:ext cx="0" cy="383059"/>
+          </a:xfrm>
+          <a:prstGeom prst="straightConnector1">
+            <a:avLst/>
+          </a:prstGeom>
+          <a:ln>
+            <a:tailEnd type="triangle"/>
+          </a:ln>
+        </p:spPr>
+        <p:style>
+          <a:lnRef idx="2">
+            <a:schemeClr val="dk1"/>
+          </a:lnRef>
+          <a:fillRef idx="1">
+            <a:schemeClr val="lt1"/>
+          </a:fillRef>
+          <a:effectRef idx="0">
+            <a:schemeClr val="dk1"/>
+          </a:effectRef>
+          <a:fontRef idx="minor">
+            <a:schemeClr val="dk1"/>
+          </a:fontRef>
+        </p:style>
+      </p:cxnSp>
+      <p:cxnSp>
+        <p:nvCxnSpPr>
+          <p:cNvPr id="80" name="직선 화살표 연결선 79">
+            <a:extLst>
+              <a:ext uri="{FF2B5EF4-FFF2-40B4-BE49-F238E27FC236}">
+                <a16:creationId xmlns:a16="http://schemas.microsoft.com/office/drawing/2014/main" id="{5EB52318-A9BD-4B62-9C9C-569115EF1E85}"/>
+              </a:ext>
+            </a:extLst>
+          </p:cNvPr>
+          <p:cNvCxnSpPr>
+            <a:cxnSpLocks/>
+            <a:stCxn id="75" idx="0"/>
+            <a:endCxn id="74" idx="2"/>
+          </p:cNvCxnSpPr>
+          <p:nvPr/>
+        </p:nvCxnSpPr>
+        <p:spPr>
+          <a:xfrm flipV="1">
+            <a:off x="8498737" y="2450757"/>
+            <a:ext cx="0" cy="383059"/>
+          </a:xfrm>
+          <a:prstGeom prst="straightConnector1">
+            <a:avLst/>
+          </a:prstGeom>
+          <a:ln>
+            <a:tailEnd type="triangle"/>
+          </a:ln>
+        </p:spPr>
+        <p:style>
+          <a:lnRef idx="2">
+            <a:schemeClr val="dk1"/>
+          </a:lnRef>
+          <a:fillRef idx="1">
+            <a:schemeClr val="lt1"/>
+          </a:fillRef>
+          <a:effectRef idx="0">
+            <a:schemeClr val="dk1"/>
+          </a:effectRef>
+          <a:fontRef idx="minor">
+            <a:schemeClr val="dk1"/>
+          </a:fontRef>
+        </p:style>
+      </p:cxnSp>
+      <p:cxnSp>
+        <p:nvCxnSpPr>
+          <p:cNvPr id="81" name="직선 화살표 연결선 80">
+            <a:extLst>
+              <a:ext uri="{FF2B5EF4-FFF2-40B4-BE49-F238E27FC236}">
+                <a16:creationId xmlns:a16="http://schemas.microsoft.com/office/drawing/2014/main" id="{0B24DE26-CFF1-4C8E-9F17-76D65E18FE9E}"/>
+              </a:ext>
+            </a:extLst>
+          </p:cNvPr>
+          <p:cNvCxnSpPr>
+            <a:cxnSpLocks/>
+            <a:stCxn id="82" idx="0"/>
+            <a:endCxn id="77" idx="2"/>
+          </p:cNvCxnSpPr>
+          <p:nvPr/>
+        </p:nvCxnSpPr>
+        <p:spPr>
+          <a:xfrm flipV="1">
+            <a:off x="8498737" y="5156886"/>
+            <a:ext cx="0" cy="333634"/>
+          </a:xfrm>
+          <a:prstGeom prst="straightConnector1">
+            <a:avLst/>
+          </a:prstGeom>
+          <a:ln>
+            <a:tailEnd type="triangle"/>
+          </a:ln>
+        </p:spPr>
+        <p:style>
+          <a:lnRef idx="2">
+            <a:schemeClr val="dk1"/>
+          </a:lnRef>
+          <a:fillRef idx="1">
+            <a:schemeClr val="lt1"/>
+          </a:fillRef>
+          <a:effectRef idx="0">
+            <a:schemeClr val="dk1"/>
+          </a:effectRef>
+          <a:fontRef idx="minor">
+            <a:schemeClr val="dk1"/>
+          </a:fontRef>
+        </p:style>
+      </p:cxnSp>
+      <mc:AlternateContent xmlns:mc="http://schemas.openxmlformats.org/markup-compatibility/2006">
+        <mc:Choice xmlns:a14="http://schemas.microsoft.com/office/drawing/2010/main" Requires="a14">
+          <p:sp>
+            <p:nvSpPr>
+              <p:cNvPr id="82" name="TextBox 81">
+                <a:extLst>
+                  <a:ext uri="{FF2B5EF4-FFF2-40B4-BE49-F238E27FC236}">
+                    <a16:creationId xmlns:a16="http://schemas.microsoft.com/office/drawing/2014/main" id="{E799825B-3727-4F39-BEAD-2E2ACE9A90BE}"/>
+                  </a:ext>
+                </a:extLst>
+              </p:cNvPr>
+              <p:cNvSpPr txBox="1"/>
+              <p:nvPr/>
+            </p:nvSpPr>
+            <p:spPr>
+              <a:xfrm>
+                <a:off x="8251265" y="5490520"/>
+                <a:ext cx="494943" cy="369332"/>
+              </a:xfrm>
+              <a:prstGeom prst="rect">
+                <a:avLst/>
+              </a:prstGeom>
+              <a:noFill/>
+            </p:spPr>
+            <p:txBody>
+              <a:bodyPr wrap="none" rtlCol="0">
+                <a:spAutoFit/>
+              </a:bodyPr>
+              <a:lstStyle/>
+              <a:p>
+                <a14:m>
+                  <m:oMathPara xmlns:m="http://schemas.openxmlformats.org/officeDocument/2006/math">
+                    <m:oMathParaPr>
+                      <m:jc m:val="centerGroup"/>
+                    </m:oMathParaPr>
+                    <m:oMath xmlns:m="http://schemas.openxmlformats.org/officeDocument/2006/math">
+                      <m:sSub>
+                        <m:sSubPr>
+                          <m:ctrlPr>
+                            <a:rPr lang="en-US" altLang="ko-KR" i="1" smtClean="0">
+                              <a:latin typeface="Cambria Math" panose="02040503050406030204" pitchFamily="18" charset="0"/>
+                            </a:rPr>
+                          </m:ctrlPr>
+                        </m:sSubPr>
+                        <m:e>
+                          <m:r>
+                            <a:rPr lang="en-US" altLang="ko-KR" b="0" i="1" smtClean="0">
+                              <a:latin typeface="Cambria Math" panose="02040503050406030204" pitchFamily="18" charset="0"/>
+                            </a:rPr>
+                            <m:t>𝑥</m:t>
+                          </m:r>
+                        </m:e>
+                        <m:sub>
+                          <m:r>
+                            <a:rPr lang="en-US" altLang="ko-KR" b="0" i="1" smtClean="0">
+                              <a:latin typeface="Cambria Math" panose="02040503050406030204" pitchFamily="18" charset="0"/>
+                            </a:rPr>
+                            <m:t>4</m:t>
+                          </m:r>
+                        </m:sub>
+                      </m:sSub>
+                    </m:oMath>
+                  </m:oMathPara>
+                </a14:m>
+                <a:endParaRPr lang="ko-KR" altLang="en-US" dirty="0"/>
+              </a:p>
+            </p:txBody>
+          </p:sp>
+        </mc:Choice>
+        <mc:Fallback>
+          <p:sp>
+            <p:nvSpPr>
+              <p:cNvPr id="82" name="TextBox 81">
+                <a:extLst>
+                  <a:ext uri="{FF2B5EF4-FFF2-40B4-BE49-F238E27FC236}">
+                    <a16:creationId xmlns:a16="http://schemas.microsoft.com/office/drawing/2014/main" id="{E799825B-3727-4F39-BEAD-2E2ACE9A90BE}"/>
+                  </a:ext>
+                </a:extLst>
+              </p:cNvPr>
+              <p:cNvSpPr txBox="1">
+                <a:spLocks noRot="1" noChangeAspect="1" noMove="1" noResize="1" noEditPoints="1" noAdjustHandles="1" noChangeArrowheads="1" noChangeShapeType="1" noTextEdit="1"/>
+              </p:cNvSpPr>
+              <p:nvPr/>
+            </p:nvSpPr>
+            <p:spPr>
+              <a:xfrm>
+                <a:off x="8251265" y="5490520"/>
+                <a:ext cx="494943" cy="369332"/>
+              </a:xfrm>
+              <a:prstGeom prst="rect">
+                <a:avLst/>
+              </a:prstGeom>
+              <a:blipFill>
+                <a:blip r:embed="rId10"/>
+                <a:stretch>
+                  <a:fillRect b="-3333"/>
+                </a:stretch>
+              </a:blipFill>
+            </p:spPr>
+            <p:txBody>
+              <a:bodyPr/>
+              <a:lstStyle/>
+              <a:p>
+                <a:r>
+                  <a:rPr lang="ko-KR" altLang="en-US">
+                    <a:noFill/>
+                  </a:rPr>
+                  <a:t> </a:t>
+                </a:r>
+              </a:p>
+            </p:txBody>
+          </p:sp>
+        </mc:Fallback>
+      </mc:AlternateContent>
+      <mc:AlternateContent xmlns:mc="http://schemas.openxmlformats.org/markup-compatibility/2006">
+        <mc:Choice xmlns:a14="http://schemas.microsoft.com/office/drawing/2010/main" Requires="a14">
+          <p:sp>
+            <p:nvSpPr>
+              <p:cNvPr id="83" name="TextBox 82">
+                <a:extLst>
+                  <a:ext uri="{FF2B5EF4-FFF2-40B4-BE49-F238E27FC236}">
+                    <a16:creationId xmlns:a16="http://schemas.microsoft.com/office/drawing/2014/main" id="{DBF48FFA-1D5D-4577-9AE3-29EAE247472C}"/>
+                  </a:ext>
+                </a:extLst>
+              </p:cNvPr>
+              <p:cNvSpPr txBox="1"/>
+              <p:nvPr/>
+            </p:nvSpPr>
+            <p:spPr>
+              <a:xfrm>
+                <a:off x="8256587" y="1228123"/>
+                <a:ext cx="494943" cy="369332"/>
+              </a:xfrm>
+              <a:prstGeom prst="rect">
+                <a:avLst/>
+              </a:prstGeom>
+              <a:noFill/>
+            </p:spPr>
+            <p:txBody>
+              <a:bodyPr wrap="none" rtlCol="0">
+                <a:spAutoFit/>
+              </a:bodyPr>
+              <a:lstStyle/>
+              <a:p>
+                <a14:m>
+                  <m:oMathPara xmlns:m="http://schemas.openxmlformats.org/officeDocument/2006/math">
+                    <m:oMathParaPr>
+                      <m:jc m:val="centerGroup"/>
+                    </m:oMathParaPr>
+                    <m:oMath xmlns:m="http://schemas.openxmlformats.org/officeDocument/2006/math">
+                      <m:sSub>
+                        <m:sSubPr>
+                          <m:ctrlPr>
+                            <a:rPr lang="en-US" altLang="ko-KR" i="1" smtClean="0">
+                              <a:latin typeface="Cambria Math" panose="02040503050406030204" pitchFamily="18" charset="0"/>
+                            </a:rPr>
+                          </m:ctrlPr>
+                        </m:sSubPr>
+                        <m:e>
+                          <m:acc>
+                            <m:accPr>
+                              <m:chr m:val="̂"/>
+                              <m:ctrlPr>
+                                <a:rPr lang="en-US" altLang="ko-KR" i="1" smtClean="0">
+                                  <a:latin typeface="Cambria Math" panose="02040503050406030204" pitchFamily="18" charset="0"/>
+                                </a:rPr>
+                              </m:ctrlPr>
+                            </m:accPr>
+                            <m:e>
+                              <m:r>
+                                <a:rPr lang="en-US" altLang="ko-KR" b="0" i="1" smtClean="0">
+                                  <a:latin typeface="Cambria Math" panose="02040503050406030204" pitchFamily="18" charset="0"/>
+                                </a:rPr>
+                                <m:t>𝑥</m:t>
+                              </m:r>
+                            </m:e>
+                          </m:acc>
+                        </m:e>
+                        <m:sub>
+                          <m:r>
+                            <a:rPr lang="en-US" altLang="ko-KR" b="0" i="1" smtClean="0">
+                              <a:latin typeface="Cambria Math" panose="02040503050406030204" pitchFamily="18" charset="0"/>
+                            </a:rPr>
+                            <m:t>5</m:t>
+                          </m:r>
+                        </m:sub>
+                      </m:sSub>
+                    </m:oMath>
+                  </m:oMathPara>
+                </a14:m>
+                <a:endParaRPr lang="ko-KR" altLang="en-US" dirty="0"/>
+              </a:p>
+            </p:txBody>
+          </p:sp>
+        </mc:Choice>
+        <mc:Fallback>
+          <p:sp>
+            <p:nvSpPr>
+              <p:cNvPr id="83" name="TextBox 82">
+                <a:extLst>
+                  <a:ext uri="{FF2B5EF4-FFF2-40B4-BE49-F238E27FC236}">
+                    <a16:creationId xmlns:a16="http://schemas.microsoft.com/office/drawing/2014/main" id="{DBF48FFA-1D5D-4577-9AE3-29EAE247472C}"/>
+                  </a:ext>
+                </a:extLst>
+              </p:cNvPr>
+              <p:cNvSpPr txBox="1">
+                <a:spLocks noRot="1" noChangeAspect="1" noMove="1" noResize="1" noEditPoints="1" noAdjustHandles="1" noChangeArrowheads="1" noChangeShapeType="1" noTextEdit="1"/>
+              </p:cNvSpPr>
+              <p:nvPr/>
+            </p:nvSpPr>
+            <p:spPr>
+              <a:xfrm>
+                <a:off x="8256587" y="1228123"/>
+                <a:ext cx="494943" cy="369332"/>
+              </a:xfrm>
+              <a:prstGeom prst="rect">
+                <a:avLst/>
+              </a:prstGeom>
+              <a:blipFill>
+                <a:blip r:embed="rId11"/>
+                <a:stretch>
+                  <a:fillRect t="-3279" r="-13415" b="-3279"/>
+                </a:stretch>
+              </a:blipFill>
+            </p:spPr>
+            <p:txBody>
+              <a:bodyPr/>
+              <a:lstStyle/>
+              <a:p>
+                <a:r>
+                  <a:rPr lang="ko-KR" altLang="en-US">
+                    <a:noFill/>
+                  </a:rPr>
+                  <a:t> </a:t>
+                </a:r>
+              </a:p>
+            </p:txBody>
+          </p:sp>
+        </mc:Fallback>
+      </mc:AlternateContent>
+      <p:cxnSp>
+        <p:nvCxnSpPr>
+          <p:cNvPr id="84" name="직선 화살표 연결선 83">
+            <a:extLst>
+              <a:ext uri="{FF2B5EF4-FFF2-40B4-BE49-F238E27FC236}">
+                <a16:creationId xmlns:a16="http://schemas.microsoft.com/office/drawing/2014/main" id="{A629E2DD-AF5D-4C9D-A4F6-09DB868A4783}"/>
+              </a:ext>
+            </a:extLst>
+          </p:cNvPr>
+          <p:cNvCxnSpPr>
+            <a:cxnSpLocks/>
+            <a:stCxn id="74" idx="0"/>
+            <a:endCxn id="83" idx="2"/>
+          </p:cNvCxnSpPr>
+          <p:nvPr/>
+        </p:nvCxnSpPr>
+        <p:spPr>
+          <a:xfrm flipV="1">
+            <a:off x="8498737" y="1597455"/>
+            <a:ext cx="5322" cy="334318"/>
+          </a:xfrm>
+          <a:prstGeom prst="straightConnector1">
+            <a:avLst/>
+          </a:prstGeom>
+          <a:ln>
+            <a:tailEnd type="triangle"/>
+          </a:ln>
+        </p:spPr>
+        <p:style>
+          <a:lnRef idx="2">
+            <a:schemeClr val="dk1"/>
+          </a:lnRef>
+          <a:fillRef idx="1">
+            <a:schemeClr val="lt1"/>
+          </a:fillRef>
+          <a:effectRef idx="0">
+            <a:schemeClr val="dk1"/>
+          </a:effectRef>
+          <a:fontRef idx="minor">
+            <a:schemeClr val="dk1"/>
+          </a:fontRef>
+        </p:style>
+      </p:cxnSp>
+      <p:cxnSp>
+        <p:nvCxnSpPr>
+          <p:cNvPr id="86" name="연결선: 구부러짐 85">
+            <a:extLst>
+              <a:ext uri="{FF2B5EF4-FFF2-40B4-BE49-F238E27FC236}">
+                <a16:creationId xmlns:a16="http://schemas.microsoft.com/office/drawing/2014/main" id="{4815E4C6-6DA5-4D42-91ED-3F66369B1AD1}"/>
+              </a:ext>
+            </a:extLst>
+          </p:cNvPr>
+          <p:cNvCxnSpPr>
+            <a:stCxn id="4" idx="0"/>
+            <a:endCxn id="44" idx="2"/>
+          </p:cNvCxnSpPr>
+          <p:nvPr/>
+        </p:nvCxnSpPr>
+        <p:spPr>
+          <a:xfrm rot="16200000" flipH="1">
+            <a:off x="1518850" y="2775122"/>
+            <a:ext cx="3225113" cy="1538415"/>
+          </a:xfrm>
+          <a:prstGeom prst="curvedConnector5">
+            <a:avLst>
+              <a:gd name="adj1" fmla="val -7088"/>
+              <a:gd name="adj2" fmla="val 50000"/>
+              <a:gd name="adj3" fmla="val 107088"/>
+            </a:avLst>
+          </a:prstGeom>
+          <a:ln>
+            <a:tailEnd type="triangle"/>
+          </a:ln>
+        </p:spPr>
+        <p:style>
+          <a:lnRef idx="2">
+            <a:schemeClr val="dk1"/>
+          </a:lnRef>
+          <a:fillRef idx="1">
+            <a:schemeClr val="lt1"/>
+          </a:fillRef>
+          <a:effectRef idx="0">
+            <a:schemeClr val="dk1"/>
+          </a:effectRef>
+          <a:fontRef idx="minor">
+            <a:schemeClr val="dk1"/>
+          </a:fontRef>
+        </p:style>
+      </p:cxnSp>
+      <p:cxnSp>
+        <p:nvCxnSpPr>
+          <p:cNvPr id="87" name="연결선: 구부러짐 86">
+            <a:extLst>
+              <a:ext uri="{FF2B5EF4-FFF2-40B4-BE49-F238E27FC236}">
+                <a16:creationId xmlns:a16="http://schemas.microsoft.com/office/drawing/2014/main" id="{CE3D1875-2CB4-436C-AE05-90119209B77C}"/>
+              </a:ext>
+            </a:extLst>
+          </p:cNvPr>
+          <p:cNvCxnSpPr>
+            <a:cxnSpLocks/>
+            <a:stCxn id="41" idx="0"/>
+            <a:endCxn id="55" idx="2"/>
+          </p:cNvCxnSpPr>
+          <p:nvPr/>
+        </p:nvCxnSpPr>
+        <p:spPr>
+          <a:xfrm rot="16200000" flipH="1">
+            <a:off x="3055935" y="2776452"/>
+            <a:ext cx="3225113" cy="1535754"/>
+          </a:xfrm>
+          <a:prstGeom prst="curvedConnector5">
+            <a:avLst>
+              <a:gd name="adj1" fmla="val -7088"/>
+              <a:gd name="adj2" fmla="val 50000"/>
+              <a:gd name="adj3" fmla="val 107088"/>
+            </a:avLst>
+          </a:prstGeom>
+          <a:ln>
+            <a:tailEnd type="triangle"/>
+          </a:ln>
+        </p:spPr>
+        <p:style>
+          <a:lnRef idx="2">
+            <a:schemeClr val="dk1"/>
+          </a:lnRef>
+          <a:fillRef idx="1">
+            <a:schemeClr val="lt1"/>
+          </a:fillRef>
+          <a:effectRef idx="0">
+            <a:schemeClr val="dk1"/>
+          </a:effectRef>
+          <a:fontRef idx="minor">
+            <a:schemeClr val="dk1"/>
+          </a:fontRef>
+        </p:style>
+      </p:cxnSp>
+      <p:cxnSp>
+        <p:nvCxnSpPr>
+          <p:cNvPr id="90" name="연결선: 구부러짐 89">
+            <a:extLst>
+              <a:ext uri="{FF2B5EF4-FFF2-40B4-BE49-F238E27FC236}">
+                <a16:creationId xmlns:a16="http://schemas.microsoft.com/office/drawing/2014/main" id="{F6B08CAB-8D3D-465C-8842-62587DF50E0F}"/>
+              </a:ext>
+            </a:extLst>
+          </p:cNvPr>
+          <p:cNvCxnSpPr>
+            <a:cxnSpLocks/>
+            <a:stCxn id="52" idx="0"/>
+            <a:endCxn id="66" idx="2"/>
+          </p:cNvCxnSpPr>
+          <p:nvPr/>
+        </p:nvCxnSpPr>
+        <p:spPr>
+          <a:xfrm rot="16200000" flipH="1">
+            <a:off x="4590358" y="2777783"/>
+            <a:ext cx="3225113" cy="1533093"/>
+          </a:xfrm>
+          <a:prstGeom prst="curvedConnector5">
+            <a:avLst>
+              <a:gd name="adj1" fmla="val -7088"/>
+              <a:gd name="adj2" fmla="val 50000"/>
+              <a:gd name="adj3" fmla="val 107088"/>
+            </a:avLst>
+          </a:prstGeom>
+          <a:ln>
+            <a:tailEnd type="triangle"/>
+          </a:ln>
+        </p:spPr>
+        <p:style>
+          <a:lnRef idx="2">
+            <a:schemeClr val="dk1"/>
+          </a:lnRef>
+          <a:fillRef idx="1">
+            <a:schemeClr val="lt1"/>
+          </a:fillRef>
+          <a:effectRef idx="0">
+            <a:schemeClr val="dk1"/>
+          </a:effectRef>
+          <a:fontRef idx="minor">
+            <a:schemeClr val="dk1"/>
+          </a:fontRef>
+        </p:style>
+      </p:cxnSp>
+      <p:cxnSp>
+        <p:nvCxnSpPr>
+          <p:cNvPr id="93" name="연결선: 구부러짐 92">
+            <a:extLst>
+              <a:ext uri="{FF2B5EF4-FFF2-40B4-BE49-F238E27FC236}">
+                <a16:creationId xmlns:a16="http://schemas.microsoft.com/office/drawing/2014/main" id="{38E42217-28B5-48AF-BBDD-02F0226A727A}"/>
+              </a:ext>
+            </a:extLst>
+          </p:cNvPr>
+          <p:cNvCxnSpPr>
+            <a:cxnSpLocks/>
+            <a:stCxn id="63" idx="0"/>
+            <a:endCxn id="77" idx="2"/>
+          </p:cNvCxnSpPr>
+          <p:nvPr/>
+        </p:nvCxnSpPr>
+        <p:spPr>
+          <a:xfrm rot="16200000" flipH="1">
+            <a:off x="6121542" y="2779692"/>
+            <a:ext cx="3225113" cy="1529275"/>
+          </a:xfrm>
+          <a:prstGeom prst="curvedConnector5">
+            <a:avLst>
+              <a:gd name="adj1" fmla="val -7088"/>
+              <a:gd name="adj2" fmla="val 50000"/>
+              <a:gd name="adj3" fmla="val 107088"/>
+            </a:avLst>
+          </a:prstGeom>
+          <a:ln>
+            <a:tailEnd type="triangle"/>
+          </a:ln>
+        </p:spPr>
+        <p:style>
+          <a:lnRef idx="2">
+            <a:schemeClr val="dk1"/>
+          </a:lnRef>
+          <a:fillRef idx="1">
+            <a:schemeClr val="lt1"/>
+          </a:fillRef>
+          <a:effectRef idx="0">
+            <a:schemeClr val="dk1"/>
+          </a:effectRef>
+          <a:fontRef idx="minor">
+            <a:schemeClr val="dk1"/>
+          </a:fontRef>
+        </p:style>
+      </p:cxnSp>
+    </p:spTree>
+    <p:extLst>
+      <p:ext uri="{BB962C8B-B14F-4D97-AF65-F5344CB8AC3E}">
+        <p14:creationId xmlns:p14="http://schemas.microsoft.com/office/powerpoint/2010/main" val="1393250788"/>
       </p:ext>
     </p:extLst>
   </p:cSld>

</xml_diff>

<commit_message>
Track 2 files into repository.
- removed assets/nmt_with_lm_ensemble_evaluation.png
- modified architecture.pptx

Auto commit by GitBook Editor
</commit_message>
<xml_diff>
--- a/architecture.pptx
+++ b/architecture.pptx
@@ -3514,10 +3514,10 @@
       </p:grpSpPr>
       <p:pic>
         <p:nvPicPr>
-          <p:cNvPr id="4" name="그림 3">
-            <a:extLst>
-              <a:ext uri="{FF2B5EF4-FFF2-40B4-BE49-F238E27FC236}">
-                <a16:creationId xmlns:a16="http://schemas.microsoft.com/office/drawing/2014/main" id="{35E409EF-4829-4246-AD12-EDFD33132A2F}"/>
+          <p:cNvPr id="5" name="그림 4">
+            <a:extLst>
+              <a:ext uri="{FF2B5EF4-FFF2-40B4-BE49-F238E27FC236}">
+                <a16:creationId xmlns:a16="http://schemas.microsoft.com/office/drawing/2014/main" id="{BF816F2B-A982-4411-A631-85A158008708}"/>
               </a:ext>
             </a:extLst>
           </p:cNvPr>
@@ -3545,8 +3545,8 @@
         </p:blipFill>
         <p:spPr>
           <a:xfrm>
-            <a:off x="0" y="1383251"/>
-            <a:ext cx="12192000" cy="4091497"/>
+            <a:off x="0" y="1909509"/>
+            <a:ext cx="12192000" cy="3038982"/>
           </a:xfrm>
           <a:prstGeom prst="rect">
             <a:avLst/>

</xml_diff>